<commit_message>
Refined spec, added mapping to implementation (made into plug-in project)
</commit_message>
<xml_diff>
--- a/JSizzle-Demo/doc/Modelling in Java.pptx
+++ b/JSizzle-Demo/doc/Modelling in Java.pptx
@@ -5,15 +5,20 @@
     <p:sldMasterId id="2147483648" r:id="rId1"/>
   </p:sldMasterIdLst>
   <p:notesMasterIdLst>
-    <p:notesMasterId r:id="rId8"/>
+    <p:notesMasterId r:id="rId13"/>
   </p:notesMasterIdLst>
   <p:sldIdLst>
     <p:sldId id="256" r:id="rId2"/>
     <p:sldId id="257" r:id="rId3"/>
-    <p:sldId id="258" r:id="rId4"/>
-    <p:sldId id="259" r:id="rId5"/>
-    <p:sldId id="260" r:id="rId6"/>
-    <p:sldId id="261" r:id="rId7"/>
+    <p:sldId id="262" r:id="rId4"/>
+    <p:sldId id="258" r:id="rId5"/>
+    <p:sldId id="259" r:id="rId6"/>
+    <p:sldId id="260" r:id="rId7"/>
+    <p:sldId id="261" r:id="rId8"/>
+    <p:sldId id="265" r:id="rId9"/>
+    <p:sldId id="266" r:id="rId10"/>
+    <p:sldId id="269" r:id="rId11"/>
+    <p:sldId id="268" r:id="rId12"/>
   </p:sldIdLst>
   <p:sldSz cx="9144000" cy="6858000" type="screen4x3"/>
   <p:notesSz cx="6858000" cy="9144000"/>
@@ -197,7 +202,7 @@
           <a:p>
             <a:fld id="{67D0FCD1-96C9-4CE8-8EF3-744D3F3FBA66}" type="datetimeFigureOut">
               <a:rPr lang="en-GB" smtClean="0"/>
-              <a:t>11/02/2012</a:t>
+              <a:t>25/02/2012</a:t>
             </a:fld>
             <a:endParaRPr lang="en-GB"/>
           </a:p>
@@ -511,21 +516,42 @@
           <a:p>
             <a:r>
               <a:rPr lang="en-GB" dirty="0" smtClean="0"/>
-              <a:t>Number happy, unhappy</a:t>
+              <a:t>Worked example</a:t>
             </a:r>
           </a:p>
           <a:p>
             <a:r>
               <a:rPr lang="en-GB" dirty="0" smtClean="0"/>
-              <a:t>Behaviour </a:t>
-            </a:r>
-            <a:r>
-              <a:rPr lang="en-GB" dirty="0" err="1" smtClean="0"/>
-              <a:t>vs</a:t>
-            </a:r>
+              <a:t>Modelling: state-based</a:t>
+            </a:r>
+          </a:p>
+          <a:p>
             <a:r>
               <a:rPr lang="en-GB" dirty="0" smtClean="0"/>
-              <a:t> state modelling</a:t>
+              <a:t>Model-driven</a:t>
+            </a:r>
+            <a:r>
+              <a:rPr lang="en-GB" baseline="0" dirty="0" smtClean="0"/>
+              <a:t>: not MDD</a:t>
+            </a:r>
+            <a:endParaRPr lang="en-GB" dirty="0" smtClean="0"/>
+          </a:p>
+          <a:p>
+            <a:r>
+              <a:rPr lang="en-GB" dirty="0" smtClean="0"/>
+              <a:t>Java: tools &amp; implementation</a:t>
+            </a:r>
+          </a:p>
+          <a:p>
+            <a:r>
+              <a:rPr lang="en-GB" dirty="0" smtClean="0"/>
+              <a:t>JCurry: tangentially</a:t>
+            </a:r>
+          </a:p>
+          <a:p>
+            <a:r>
+              <a:rPr lang="en-GB" dirty="0" smtClean="0"/>
+              <a:t>JSizzle: exemplar, scratching surface</a:t>
             </a:r>
             <a:endParaRPr lang="en-GB" dirty="0"/>
           </a:p>
@@ -557,7 +583,7 @@
     </p:spTree>
     <p:extLst>
       <p:ext uri="{BB962C8B-B14F-4D97-AF65-F5344CB8AC3E}">
-        <p14:creationId xmlns:p14="http://schemas.microsoft.com/office/powerpoint/2010/main" val="1850191238"/>
+        <p14:creationId xmlns:p14="http://schemas.microsoft.com/office/powerpoint/2010/main" val="3796217703"/>
       </p:ext>
     </p:extLst>
   </p:cSld>
@@ -613,10 +639,22 @@
           <a:p>
             <a:r>
               <a:rPr lang="en-GB" dirty="0" smtClean="0"/>
-              <a:t>Constraints?</a:t>
-            </a:r>
-          </a:p>
-          <a:p>
+              <a:t>Number happy, unhappy</a:t>
+            </a:r>
+          </a:p>
+          <a:p>
+            <a:r>
+              <a:rPr lang="en-GB" dirty="0" smtClean="0"/>
+              <a:t>Behaviour </a:t>
+            </a:r>
+            <a:r>
+              <a:rPr lang="en-GB" dirty="0" err="1" smtClean="0"/>
+              <a:t>vs</a:t>
+            </a:r>
+            <a:r>
+              <a:rPr lang="en-GB" dirty="0" smtClean="0"/>
+              <a:t> state modelling</a:t>
+            </a:r>
             <a:endParaRPr lang="en-GB" dirty="0"/>
           </a:p>
         </p:txBody>
@@ -638,7 +676,7 @@
           <a:p>
             <a:fld id="{FA02D333-9BE1-4B85-91BF-F46F8636CE68}" type="slidenum">
               <a:rPr lang="en-GB" smtClean="0"/>
-              <a:t>5</a:t>
+              <a:t>4</a:t>
             </a:fld>
             <a:endParaRPr lang="en-GB"/>
           </a:p>
@@ -647,7 +685,7 @@
     </p:spTree>
     <p:extLst>
       <p:ext uri="{BB962C8B-B14F-4D97-AF65-F5344CB8AC3E}">
-        <p14:creationId xmlns:p14="http://schemas.microsoft.com/office/powerpoint/2010/main" val="2618552895"/>
+        <p14:creationId xmlns:p14="http://schemas.microsoft.com/office/powerpoint/2010/main" val="1850191238"/>
       </p:ext>
     </p:extLst>
   </p:cSld>
@@ -703,8 +741,11 @@
           <a:p>
             <a:r>
               <a:rPr lang="en-GB" dirty="0" smtClean="0"/>
-              <a:t>Notation</a:t>
-            </a:r>
+              <a:t>Constraints?</a:t>
+            </a:r>
+          </a:p>
+          <a:p>
+            <a:endParaRPr lang="en-GB" dirty="0"/>
           </a:p>
         </p:txBody>
       </p:sp>
@@ -734,7 +775,392 @@
     </p:spTree>
     <p:extLst>
       <p:ext uri="{BB962C8B-B14F-4D97-AF65-F5344CB8AC3E}">
+        <p14:creationId xmlns:p14="http://schemas.microsoft.com/office/powerpoint/2010/main" val="2618552895"/>
+      </p:ext>
+    </p:extLst>
+  </p:cSld>
+  <p:clrMapOvr>
+    <a:masterClrMapping/>
+  </p:clrMapOvr>
+</p:notes>
+</file>
+
+<file path=ppt/notesSlides/notesSlide4.xml><?xml version="1.0" encoding="utf-8"?>
+<p:notes xmlns:a="http://schemas.openxmlformats.org/drawingml/2006/main" xmlns:r="http://schemas.openxmlformats.org/officeDocument/2006/relationships" xmlns:p="http://schemas.openxmlformats.org/presentationml/2006/main">
+  <p:cSld>
+    <p:spTree>
+      <p:nvGrpSpPr>
+        <p:cNvPr id="1" name=""/>
+        <p:cNvGrpSpPr/>
+        <p:nvPr/>
+      </p:nvGrpSpPr>
+      <p:grpSpPr>
+        <a:xfrm>
+          <a:off x="0" y="0"/>
+          <a:ext cx="0" cy="0"/>
+          <a:chOff x="0" y="0"/>
+          <a:chExt cx="0" cy="0"/>
+        </a:xfrm>
+      </p:grpSpPr>
+      <p:sp>
+        <p:nvSpPr>
+          <p:cNvPr id="2" name="Slide Image Placeholder 1"/>
+          <p:cNvSpPr>
+            <a:spLocks noGrp="1" noRot="1" noChangeAspect="1"/>
+          </p:cNvSpPr>
+          <p:nvPr>
+            <p:ph type="sldImg"/>
+          </p:nvPr>
+        </p:nvSpPr>
+        <p:spPr/>
+      </p:sp>
+      <p:sp>
+        <p:nvSpPr>
+          <p:cNvPr id="3" name="Notes Placeholder 2"/>
+          <p:cNvSpPr>
+            <a:spLocks noGrp="1"/>
+          </p:cNvSpPr>
+          <p:nvPr>
+            <p:ph type="body" idx="1"/>
+          </p:nvPr>
+        </p:nvSpPr>
+        <p:spPr/>
+        <p:txBody>
+          <a:bodyPr/>
+          <a:lstStyle/>
+          <a:p>
+            <a:r>
+              <a:rPr lang="en-GB" dirty="0" smtClean="0"/>
+              <a:t>Notation</a:t>
+            </a:r>
+          </a:p>
+        </p:txBody>
+      </p:sp>
+      <p:sp>
+        <p:nvSpPr>
+          <p:cNvPr id="4" name="Slide Number Placeholder 3"/>
+          <p:cNvSpPr>
+            <a:spLocks noGrp="1"/>
+          </p:cNvSpPr>
+          <p:nvPr>
+            <p:ph type="sldNum" sz="quarter" idx="10"/>
+          </p:nvPr>
+        </p:nvSpPr>
+        <p:spPr/>
+        <p:txBody>
+          <a:bodyPr/>
+          <a:lstStyle/>
+          <a:p>
+            <a:fld id="{FA02D333-9BE1-4B85-91BF-F46F8636CE68}" type="slidenum">
+              <a:rPr lang="en-GB" smtClean="0"/>
+              <a:t>7</a:t>
+            </a:fld>
+            <a:endParaRPr lang="en-GB"/>
+          </a:p>
+        </p:txBody>
+      </p:sp>
+    </p:spTree>
+    <p:extLst>
+      <p:ext uri="{BB962C8B-B14F-4D97-AF65-F5344CB8AC3E}">
         <p14:creationId xmlns:p14="http://schemas.microsoft.com/office/powerpoint/2010/main" val="730106914"/>
+      </p:ext>
+    </p:extLst>
+  </p:cSld>
+  <p:clrMapOvr>
+    <a:masterClrMapping/>
+  </p:clrMapOvr>
+</p:notes>
+</file>
+
+<file path=ppt/notesSlides/notesSlide5.xml><?xml version="1.0" encoding="utf-8"?>
+<p:notes xmlns:a="http://schemas.openxmlformats.org/drawingml/2006/main" xmlns:r="http://schemas.openxmlformats.org/officeDocument/2006/relationships" xmlns:p="http://schemas.openxmlformats.org/presentationml/2006/main">
+  <p:cSld>
+    <p:spTree>
+      <p:nvGrpSpPr>
+        <p:cNvPr id="1" name=""/>
+        <p:cNvGrpSpPr/>
+        <p:nvPr/>
+      </p:nvGrpSpPr>
+      <p:grpSpPr>
+        <a:xfrm>
+          <a:off x="0" y="0"/>
+          <a:ext cx="0" cy="0"/>
+          <a:chOff x="0" y="0"/>
+          <a:chExt cx="0" cy="0"/>
+        </a:xfrm>
+      </p:grpSpPr>
+      <p:sp>
+        <p:nvSpPr>
+          <p:cNvPr id="2" name="Slide Image Placeholder 1"/>
+          <p:cNvSpPr>
+            <a:spLocks noGrp="1" noRot="1" noChangeAspect="1"/>
+          </p:cNvSpPr>
+          <p:nvPr>
+            <p:ph type="sldImg"/>
+          </p:nvPr>
+        </p:nvSpPr>
+        <p:spPr/>
+      </p:sp>
+      <p:sp>
+        <p:nvSpPr>
+          <p:cNvPr id="3" name="Notes Placeholder 2"/>
+          <p:cNvSpPr>
+            <a:spLocks noGrp="1"/>
+          </p:cNvSpPr>
+          <p:nvPr>
+            <p:ph type="body" idx="1"/>
+          </p:nvPr>
+        </p:nvSpPr>
+        <p:spPr/>
+        <p:txBody>
+          <a:bodyPr/>
+          <a:lstStyle/>
+          <a:p>
+            <a:r>
+              <a:rPr lang="en-GB" dirty="0" smtClean="0"/>
+              <a:t>Initialisers</a:t>
+            </a:r>
+            <a:r>
+              <a:rPr lang="en-GB" baseline="0" dirty="0" smtClean="0"/>
+              <a:t>: allow animation</a:t>
+            </a:r>
+            <a:endParaRPr lang="en-GB" dirty="0"/>
+          </a:p>
+        </p:txBody>
+      </p:sp>
+      <p:sp>
+        <p:nvSpPr>
+          <p:cNvPr id="4" name="Slide Number Placeholder 3"/>
+          <p:cNvSpPr>
+            <a:spLocks noGrp="1"/>
+          </p:cNvSpPr>
+          <p:nvPr>
+            <p:ph type="sldNum" sz="quarter" idx="10"/>
+          </p:nvPr>
+        </p:nvSpPr>
+        <p:spPr/>
+        <p:txBody>
+          <a:bodyPr/>
+          <a:lstStyle/>
+          <a:p>
+            <a:fld id="{FA02D333-9BE1-4B85-91BF-F46F8636CE68}" type="slidenum">
+              <a:rPr lang="en-GB" smtClean="0"/>
+              <a:t>9</a:t>
+            </a:fld>
+            <a:endParaRPr lang="en-GB"/>
+          </a:p>
+        </p:txBody>
+      </p:sp>
+    </p:spTree>
+    <p:extLst>
+      <p:ext uri="{BB962C8B-B14F-4D97-AF65-F5344CB8AC3E}">
+        <p14:creationId xmlns:p14="http://schemas.microsoft.com/office/powerpoint/2010/main" val="654099180"/>
+      </p:ext>
+    </p:extLst>
+  </p:cSld>
+  <p:clrMapOvr>
+    <a:masterClrMapping/>
+  </p:clrMapOvr>
+</p:notes>
+</file>
+
+<file path=ppt/notesSlides/notesSlide6.xml><?xml version="1.0" encoding="utf-8"?>
+<p:notes xmlns:a="http://schemas.openxmlformats.org/drawingml/2006/main" xmlns:r="http://schemas.openxmlformats.org/officeDocument/2006/relationships" xmlns:p="http://schemas.openxmlformats.org/presentationml/2006/main">
+  <p:cSld>
+    <p:spTree>
+      <p:nvGrpSpPr>
+        <p:cNvPr id="1" name=""/>
+        <p:cNvGrpSpPr/>
+        <p:nvPr/>
+      </p:nvGrpSpPr>
+      <p:grpSpPr>
+        <a:xfrm>
+          <a:off x="0" y="0"/>
+          <a:ext cx="0" cy="0"/>
+          <a:chOff x="0" y="0"/>
+          <a:chExt cx="0" cy="0"/>
+        </a:xfrm>
+      </p:grpSpPr>
+      <p:sp>
+        <p:nvSpPr>
+          <p:cNvPr id="2" name="Slide Image Placeholder 1"/>
+          <p:cNvSpPr>
+            <a:spLocks noGrp="1" noRot="1" noChangeAspect="1"/>
+          </p:cNvSpPr>
+          <p:nvPr>
+            <p:ph type="sldImg"/>
+          </p:nvPr>
+        </p:nvSpPr>
+        <p:spPr/>
+      </p:sp>
+      <p:sp>
+        <p:nvSpPr>
+          <p:cNvPr id="3" name="Notes Placeholder 2"/>
+          <p:cNvSpPr>
+            <a:spLocks noGrp="1"/>
+          </p:cNvSpPr>
+          <p:nvPr>
+            <p:ph type="body" idx="1"/>
+          </p:nvPr>
+        </p:nvSpPr>
+        <p:spPr/>
+        <p:txBody>
+          <a:bodyPr/>
+          <a:lstStyle/>
+          <a:p>
+            <a:r>
+              <a:rPr lang="en-GB" dirty="0" smtClean="0"/>
+              <a:t>Options:</a:t>
+            </a:r>
+            <a:r>
+              <a:rPr lang="en-GB" baseline="0" dirty="0" smtClean="0"/>
+              <a:t> in mapping code (e.g. abstract list)</a:t>
+            </a:r>
+          </a:p>
+          <a:p>
+            <a:r>
+              <a:rPr lang="en-GB" baseline="0" dirty="0" smtClean="0"/>
+              <a:t>Gap: Size of QAPI/</a:t>
+            </a:r>
+            <a:r>
+              <a:rPr lang="en-GB" baseline="0" dirty="0" err="1" smtClean="0"/>
+              <a:t>Impl</a:t>
+            </a:r>
+            <a:r>
+              <a:rPr lang="en-GB" baseline="0" dirty="0" smtClean="0"/>
+              <a:t> vs. model</a:t>
+            </a:r>
+          </a:p>
+          <a:p>
+            <a:r>
+              <a:rPr lang="en-GB" baseline="0" dirty="0" smtClean="0"/>
+              <a:t>Also features (e.g. groups)</a:t>
+            </a:r>
+            <a:endParaRPr lang="en-GB" dirty="0"/>
+          </a:p>
+        </p:txBody>
+      </p:sp>
+      <p:sp>
+        <p:nvSpPr>
+          <p:cNvPr id="4" name="Slide Number Placeholder 3"/>
+          <p:cNvSpPr>
+            <a:spLocks noGrp="1"/>
+          </p:cNvSpPr>
+          <p:nvPr>
+            <p:ph type="sldNum" sz="quarter" idx="10"/>
+          </p:nvPr>
+        </p:nvSpPr>
+        <p:spPr/>
+        <p:txBody>
+          <a:bodyPr/>
+          <a:lstStyle/>
+          <a:p>
+            <a:fld id="{FA02D333-9BE1-4B85-91BF-F46F8636CE68}" type="slidenum">
+              <a:rPr lang="en-GB" smtClean="0"/>
+              <a:t>10</a:t>
+            </a:fld>
+            <a:endParaRPr lang="en-GB"/>
+          </a:p>
+        </p:txBody>
+      </p:sp>
+    </p:spTree>
+    <p:extLst>
+      <p:ext uri="{BB962C8B-B14F-4D97-AF65-F5344CB8AC3E}">
+        <p14:creationId xmlns:p14="http://schemas.microsoft.com/office/powerpoint/2010/main" val="2160544336"/>
+      </p:ext>
+    </p:extLst>
+  </p:cSld>
+  <p:clrMapOvr>
+    <a:masterClrMapping/>
+  </p:clrMapOvr>
+</p:notes>
+</file>
+
+<file path=ppt/notesSlides/notesSlide7.xml><?xml version="1.0" encoding="utf-8"?>
+<p:notes xmlns:a="http://schemas.openxmlformats.org/drawingml/2006/main" xmlns:r="http://schemas.openxmlformats.org/officeDocument/2006/relationships" xmlns:p="http://schemas.openxmlformats.org/presentationml/2006/main">
+  <p:cSld>
+    <p:spTree>
+      <p:nvGrpSpPr>
+        <p:cNvPr id="1" name=""/>
+        <p:cNvGrpSpPr/>
+        <p:nvPr/>
+      </p:nvGrpSpPr>
+      <p:grpSpPr>
+        <a:xfrm>
+          <a:off x="0" y="0"/>
+          <a:ext cx="0" cy="0"/>
+          <a:chOff x="0" y="0"/>
+          <a:chExt cx="0" cy="0"/>
+        </a:xfrm>
+      </p:grpSpPr>
+      <p:sp>
+        <p:nvSpPr>
+          <p:cNvPr id="2" name="Slide Image Placeholder 1"/>
+          <p:cNvSpPr>
+            <a:spLocks noGrp="1" noRot="1" noChangeAspect="1"/>
+          </p:cNvSpPr>
+          <p:nvPr>
+            <p:ph type="sldImg"/>
+          </p:nvPr>
+        </p:nvSpPr>
+        <p:spPr/>
+      </p:sp>
+      <p:sp>
+        <p:nvSpPr>
+          <p:cNvPr id="3" name="Notes Placeholder 2"/>
+          <p:cNvSpPr>
+            <a:spLocks noGrp="1"/>
+          </p:cNvSpPr>
+          <p:nvPr>
+            <p:ph type="body" idx="1"/>
+          </p:nvPr>
+        </p:nvSpPr>
+        <p:spPr/>
+        <p:txBody>
+          <a:bodyPr/>
+          <a:lstStyle/>
+          <a:p>
+            <a:r>
+              <a:rPr lang="en-GB" baseline="0" dirty="0" smtClean="0"/>
+              <a:t>Z: Designed to be alike; </a:t>
+            </a:r>
+          </a:p>
+          <a:p>
+            <a:r>
+              <a:rPr lang="en-GB" baseline="0" dirty="0" smtClean="0"/>
+              <a:t>Transitions: behavioural</a:t>
+            </a:r>
+            <a:endParaRPr lang="en-GB" dirty="0"/>
+          </a:p>
+        </p:txBody>
+      </p:sp>
+      <p:sp>
+        <p:nvSpPr>
+          <p:cNvPr id="4" name="Slide Number Placeholder 3"/>
+          <p:cNvSpPr>
+            <a:spLocks noGrp="1"/>
+          </p:cNvSpPr>
+          <p:nvPr>
+            <p:ph type="sldNum" sz="quarter" idx="10"/>
+          </p:nvPr>
+        </p:nvSpPr>
+        <p:spPr/>
+        <p:txBody>
+          <a:bodyPr/>
+          <a:lstStyle/>
+          <a:p>
+            <a:fld id="{FA02D333-9BE1-4B85-91BF-F46F8636CE68}" type="slidenum">
+              <a:rPr lang="en-GB" smtClean="0"/>
+              <a:t>11</a:t>
+            </a:fld>
+            <a:endParaRPr lang="en-GB"/>
+          </a:p>
+        </p:txBody>
+      </p:sp>
+    </p:spTree>
+    <p:extLst>
+      <p:ext uri="{BB962C8B-B14F-4D97-AF65-F5344CB8AC3E}">
+        <p14:creationId xmlns:p14="http://schemas.microsoft.com/office/powerpoint/2010/main" val="628476071"/>
       </p:ext>
     </p:extLst>
   </p:cSld>
@@ -925,7 +1351,7 @@
           <a:p>
             <a:fld id="{69F27632-3644-44C9-B417-C0B620760139}" type="datetimeFigureOut">
               <a:rPr lang="en-GB" smtClean="0"/>
-              <a:t>11/02/2012</a:t>
+              <a:t>25/02/2012</a:t>
             </a:fld>
             <a:endParaRPr lang="en-GB"/>
           </a:p>
@@ -1095,7 +1521,7 @@
           <a:p>
             <a:fld id="{69F27632-3644-44C9-B417-C0B620760139}" type="datetimeFigureOut">
               <a:rPr lang="en-GB" smtClean="0"/>
-              <a:t>11/02/2012</a:t>
+              <a:t>25/02/2012</a:t>
             </a:fld>
             <a:endParaRPr lang="en-GB"/>
           </a:p>
@@ -1275,7 +1701,7 @@
           <a:p>
             <a:fld id="{69F27632-3644-44C9-B417-C0B620760139}" type="datetimeFigureOut">
               <a:rPr lang="en-GB" smtClean="0"/>
-              <a:t>11/02/2012</a:t>
+              <a:t>25/02/2012</a:t>
             </a:fld>
             <a:endParaRPr lang="en-GB"/>
           </a:p>
@@ -1477,7 +1903,7 @@
           <a:p>
             <a:fld id="{69F27632-3644-44C9-B417-C0B620760139}" type="datetimeFigureOut">
               <a:rPr lang="en-GB" smtClean="0"/>
-              <a:t>11/02/2012</a:t>
+              <a:t>25/02/2012</a:t>
             </a:fld>
             <a:endParaRPr lang="en-GB"/>
           </a:p>
@@ -1723,7 +2149,7 @@
           <a:p>
             <a:fld id="{69F27632-3644-44C9-B417-C0B620760139}" type="datetimeFigureOut">
               <a:rPr lang="en-GB" smtClean="0"/>
-              <a:t>11/02/2012</a:t>
+              <a:t>25/02/2012</a:t>
             </a:fld>
             <a:endParaRPr lang="en-GB"/>
           </a:p>
@@ -2011,7 +2437,7 @@
           <a:p>
             <a:fld id="{69F27632-3644-44C9-B417-C0B620760139}" type="datetimeFigureOut">
               <a:rPr lang="en-GB" smtClean="0"/>
-              <a:t>11/02/2012</a:t>
+              <a:t>25/02/2012</a:t>
             </a:fld>
             <a:endParaRPr lang="en-GB"/>
           </a:p>
@@ -2433,7 +2859,7 @@
           <a:p>
             <a:fld id="{69F27632-3644-44C9-B417-C0B620760139}" type="datetimeFigureOut">
               <a:rPr lang="en-GB" smtClean="0"/>
-              <a:t>11/02/2012</a:t>
+              <a:t>25/02/2012</a:t>
             </a:fld>
             <a:endParaRPr lang="en-GB"/>
           </a:p>
@@ -2551,7 +2977,7 @@
           <a:p>
             <a:fld id="{69F27632-3644-44C9-B417-C0B620760139}" type="datetimeFigureOut">
               <a:rPr lang="en-GB" smtClean="0"/>
-              <a:t>11/02/2012</a:t>
+              <a:t>25/02/2012</a:t>
             </a:fld>
             <a:endParaRPr lang="en-GB"/>
           </a:p>
@@ -2646,7 +3072,7 @@
           <a:p>
             <a:fld id="{69F27632-3644-44C9-B417-C0B620760139}" type="datetimeFigureOut">
               <a:rPr lang="en-GB" smtClean="0"/>
-              <a:t>11/02/2012</a:t>
+              <a:t>25/02/2012</a:t>
             </a:fld>
             <a:endParaRPr lang="en-GB"/>
           </a:p>
@@ -2923,7 +3349,7 @@
           <a:p>
             <a:fld id="{69F27632-3644-44C9-B417-C0B620760139}" type="datetimeFigureOut">
               <a:rPr lang="en-GB" smtClean="0"/>
-              <a:t>11/02/2012</a:t>
+              <a:t>25/02/2012</a:t>
             </a:fld>
             <a:endParaRPr lang="en-GB"/>
           </a:p>
@@ -3176,7 +3602,7 @@
           <a:p>
             <a:fld id="{69F27632-3644-44C9-B417-C0B620760139}" type="datetimeFigureOut">
               <a:rPr lang="en-GB" smtClean="0"/>
-              <a:t>11/02/2012</a:t>
+              <a:t>25/02/2012</a:t>
             </a:fld>
             <a:endParaRPr lang="en-GB"/>
           </a:p>
@@ -3389,7 +3815,7 @@
           <a:p>
             <a:fld id="{69F27632-3644-44C9-B417-C0B620760139}" type="datetimeFigureOut">
               <a:rPr lang="en-GB" smtClean="0"/>
-              <a:t>11/02/2012</a:t>
+              <a:t>25/02/2012</a:t>
             </a:fld>
             <a:endParaRPr lang="en-GB"/>
           </a:p>
@@ -3846,6 +4272,196 @@
 </p:sld>
 </file>
 
+<file path=ppt/slides/slide10.xml><?xml version="1.0" encoding="utf-8"?>
+<p:sld xmlns:a="http://schemas.openxmlformats.org/drawingml/2006/main" xmlns:r="http://schemas.openxmlformats.org/officeDocument/2006/relationships" xmlns:p="http://schemas.openxmlformats.org/presentationml/2006/main">
+  <p:cSld>
+    <p:spTree>
+      <p:nvGrpSpPr>
+        <p:cNvPr id="1" name=""/>
+        <p:cNvGrpSpPr/>
+        <p:nvPr/>
+      </p:nvGrpSpPr>
+      <p:grpSpPr>
+        <a:xfrm>
+          <a:off x="0" y="0"/>
+          <a:ext cx="0" cy="0"/>
+          <a:chOff x="0" y="0"/>
+          <a:chExt cx="0" cy="0"/>
+        </a:xfrm>
+      </p:grpSpPr>
+      <p:sp>
+        <p:nvSpPr>
+          <p:cNvPr id="2" name="Title 1"/>
+          <p:cNvSpPr>
+            <a:spLocks noGrp="1"/>
+          </p:cNvSpPr>
+          <p:nvPr>
+            <p:ph type="title"/>
+          </p:nvPr>
+        </p:nvSpPr>
+        <p:spPr/>
+        <p:txBody>
+          <a:bodyPr/>
+          <a:lstStyle/>
+          <a:p>
+            <a:r>
+              <a:rPr lang="en-GB" dirty="0" smtClean="0"/>
+              <a:t>Instrumentation</a:t>
+            </a:r>
+            <a:endParaRPr lang="en-GB" dirty="0"/>
+          </a:p>
+        </p:txBody>
+      </p:sp>
+      <p:sp>
+        <p:nvSpPr>
+          <p:cNvPr id="3" name="Content Placeholder 2"/>
+          <p:cNvSpPr>
+            <a:spLocks noGrp="1"/>
+          </p:cNvSpPr>
+          <p:nvPr>
+            <p:ph idx="1"/>
+          </p:nvPr>
+        </p:nvSpPr>
+        <p:spPr/>
+        <p:txBody>
+          <a:bodyPr/>
+          <a:lstStyle/>
+          <a:p>
+            <a:r>
+              <a:rPr lang="en-GB" dirty="0" smtClean="0"/>
+              <a:t>Lots </a:t>
+            </a:r>
+            <a:r>
+              <a:rPr lang="en-GB" dirty="0" smtClean="0"/>
+              <a:t>of options (it’s Java</a:t>
+            </a:r>
+            <a:r>
+              <a:rPr lang="en-GB" dirty="0" smtClean="0"/>
+              <a:t>!)</a:t>
+            </a:r>
+          </a:p>
+          <a:p>
+            <a:r>
+              <a:rPr lang="en-GB" dirty="0" smtClean="0"/>
+              <a:t>Abstraction gap</a:t>
+            </a:r>
+            <a:endParaRPr lang="en-GB" dirty="0" smtClean="0"/>
+          </a:p>
+          <a:p>
+            <a:r>
+              <a:rPr lang="en-GB" dirty="0" smtClean="0"/>
+              <a:t>Ad-hoc animation</a:t>
+            </a:r>
+          </a:p>
+          <a:p>
+            <a:r>
+              <a:rPr lang="en-GB" dirty="0" smtClean="0"/>
+              <a:t>Unit tests</a:t>
+            </a:r>
+            <a:endParaRPr lang="en-GB" dirty="0"/>
+          </a:p>
+        </p:txBody>
+      </p:sp>
+    </p:spTree>
+    <p:extLst>
+      <p:ext uri="{BB962C8B-B14F-4D97-AF65-F5344CB8AC3E}">
+        <p14:creationId xmlns:p14="http://schemas.microsoft.com/office/powerpoint/2010/main" val="930596272"/>
+      </p:ext>
+    </p:extLst>
+  </p:cSld>
+  <p:clrMapOvr>
+    <a:masterClrMapping/>
+  </p:clrMapOvr>
+</p:sld>
+</file>
+
+<file path=ppt/slides/slide11.xml><?xml version="1.0" encoding="utf-8"?>
+<p:sld xmlns:a="http://schemas.openxmlformats.org/drawingml/2006/main" xmlns:r="http://schemas.openxmlformats.org/officeDocument/2006/relationships" xmlns:p="http://schemas.openxmlformats.org/presentationml/2006/main">
+  <p:cSld>
+    <p:spTree>
+      <p:nvGrpSpPr>
+        <p:cNvPr id="1" name=""/>
+        <p:cNvGrpSpPr/>
+        <p:nvPr/>
+      </p:nvGrpSpPr>
+      <p:grpSpPr>
+        <a:xfrm>
+          <a:off x="0" y="0"/>
+          <a:ext cx="0" cy="0"/>
+          <a:chOff x="0" y="0"/>
+          <a:chExt cx="0" cy="0"/>
+        </a:xfrm>
+      </p:grpSpPr>
+      <p:sp>
+        <p:nvSpPr>
+          <p:cNvPr id="2" name="Title 1"/>
+          <p:cNvSpPr>
+            <a:spLocks noGrp="1"/>
+          </p:cNvSpPr>
+          <p:nvPr>
+            <p:ph type="title"/>
+          </p:nvPr>
+        </p:nvSpPr>
+        <p:spPr/>
+        <p:txBody>
+          <a:bodyPr/>
+          <a:lstStyle/>
+          <a:p>
+            <a:r>
+              <a:rPr lang="en-GB" dirty="0" smtClean="0"/>
+              <a:t>Z Influence</a:t>
+            </a:r>
+            <a:endParaRPr lang="en-GB" dirty="0"/>
+          </a:p>
+        </p:txBody>
+      </p:sp>
+      <p:sp>
+        <p:nvSpPr>
+          <p:cNvPr id="3" name="Content Placeholder 2"/>
+          <p:cNvSpPr>
+            <a:spLocks noGrp="1"/>
+          </p:cNvSpPr>
+          <p:nvPr>
+            <p:ph idx="1"/>
+          </p:nvPr>
+        </p:nvSpPr>
+        <p:spPr/>
+        <p:txBody>
+          <a:bodyPr/>
+          <a:lstStyle/>
+          <a:p>
+            <a:r>
+              <a:rPr lang="en-GB" dirty="0" smtClean="0"/>
+              <a:t>Export to Z</a:t>
+            </a:r>
+          </a:p>
+          <a:p>
+            <a:r>
+              <a:rPr lang="en-GB" dirty="0" smtClean="0"/>
+              <a:t>State transitions</a:t>
+            </a:r>
+          </a:p>
+          <a:p>
+            <a:r>
+              <a:rPr lang="en-GB" dirty="0" smtClean="0"/>
+              <a:t>Promotion</a:t>
+            </a:r>
+          </a:p>
+        </p:txBody>
+      </p:sp>
+    </p:spTree>
+    <p:extLst>
+      <p:ext uri="{BB962C8B-B14F-4D97-AF65-F5344CB8AC3E}">
+        <p14:creationId xmlns:p14="http://schemas.microsoft.com/office/powerpoint/2010/main" val="849486849"/>
+      </p:ext>
+    </p:extLst>
+  </p:cSld>
+  <p:clrMapOvr>
+    <a:masterClrMapping/>
+  </p:clrMapOvr>
+</p:sld>
+</file>
+
 <file path=ppt/slides/slide2.xml><?xml version="1.0" encoding="utf-8"?>
 <p:sld xmlns:a="http://schemas.openxmlformats.org/drawingml/2006/main" xmlns:r="http://schemas.openxmlformats.org/officeDocument/2006/relationships" xmlns:p="http://schemas.openxmlformats.org/presentationml/2006/main">
   <p:cSld>
@@ -3929,6 +4545,12 @@
             <a:r>
               <a:rPr lang="en-GB" dirty="0" smtClean="0"/>
               <a:t>Technical Director @ IDBS</a:t>
+            </a:r>
+          </a:p>
+          <a:p>
+            <a:r>
+              <a:rPr lang="en-GB" sz="2000" dirty="0" smtClean="0"/>
+              <a:t>gsvarovsky@idbs.com</a:t>
             </a:r>
           </a:p>
           <a:p>
@@ -3971,6 +4593,113 @@
 </file>
 
 <file path=ppt/slides/slide3.xml><?xml version="1.0" encoding="utf-8"?>
+<p:sld xmlns:a="http://schemas.openxmlformats.org/drawingml/2006/main" xmlns:r="http://schemas.openxmlformats.org/officeDocument/2006/relationships" xmlns:p="http://schemas.openxmlformats.org/presentationml/2006/main">
+  <p:cSld>
+    <p:spTree>
+      <p:nvGrpSpPr>
+        <p:cNvPr id="1" name=""/>
+        <p:cNvGrpSpPr/>
+        <p:nvPr/>
+      </p:nvGrpSpPr>
+      <p:grpSpPr>
+        <a:xfrm>
+          <a:off x="0" y="0"/>
+          <a:ext cx="0" cy="0"/>
+          <a:chOff x="0" y="0"/>
+          <a:chExt cx="0" cy="0"/>
+        </a:xfrm>
+      </p:grpSpPr>
+      <p:sp>
+        <p:nvSpPr>
+          <p:cNvPr id="2" name="Title 1"/>
+          <p:cNvSpPr>
+            <a:spLocks noGrp="1"/>
+          </p:cNvSpPr>
+          <p:nvPr>
+            <p:ph type="title"/>
+          </p:nvPr>
+        </p:nvSpPr>
+        <p:spPr/>
+        <p:txBody>
+          <a:bodyPr/>
+          <a:lstStyle/>
+          <a:p>
+            <a:r>
+              <a:rPr lang="en-GB" dirty="0" smtClean="0"/>
+              <a:t>This</a:t>
+            </a:r>
+            <a:endParaRPr lang="en-GB" dirty="0"/>
+          </a:p>
+        </p:txBody>
+      </p:sp>
+      <p:sp>
+        <p:nvSpPr>
+          <p:cNvPr id="3" name="Content Placeholder 2"/>
+          <p:cNvSpPr>
+            <a:spLocks noGrp="1"/>
+          </p:cNvSpPr>
+          <p:nvPr>
+            <p:ph idx="1"/>
+          </p:nvPr>
+        </p:nvSpPr>
+        <p:spPr/>
+        <p:txBody>
+          <a:bodyPr/>
+          <a:lstStyle/>
+          <a:p>
+            <a:r>
+              <a:rPr lang="en-GB" dirty="0" smtClean="0"/>
+              <a:t>Modelling</a:t>
+            </a:r>
+          </a:p>
+          <a:p>
+            <a:r>
+              <a:rPr lang="en-GB" dirty="0" smtClean="0"/>
+              <a:t>Model-driven development</a:t>
+            </a:r>
+          </a:p>
+          <a:p>
+            <a:r>
+              <a:rPr lang="en-GB" dirty="0" smtClean="0"/>
+              <a:t>Java</a:t>
+            </a:r>
+          </a:p>
+          <a:p>
+            <a:r>
+              <a:rPr lang="en-GB" dirty="0" smtClean="0"/>
+              <a:t>JCurry</a:t>
+            </a:r>
+          </a:p>
+          <a:p>
+            <a:r>
+              <a:rPr lang="en-GB" dirty="0" smtClean="0"/>
+              <a:t>JSizzle </a:t>
+            </a:r>
+            <a:endParaRPr lang="en-GB" dirty="0"/>
+          </a:p>
+        </p:txBody>
+      </p:sp>
+    </p:spTree>
+    <p:extLst>
+      <p:ext uri="{BB962C8B-B14F-4D97-AF65-F5344CB8AC3E}">
+        <p14:creationId xmlns:p14="http://schemas.microsoft.com/office/powerpoint/2010/main" val="3596443664"/>
+      </p:ext>
+    </p:extLst>
+  </p:cSld>
+  <p:clrMapOvr>
+    <a:masterClrMapping/>
+  </p:clrMapOvr>
+  <p:timing>
+    <p:tnLst>
+      <p:par>
+        <p:cTn id="1" dur="indefinite" restart="never" nodeType="tmRoot"/>
+      </p:par>
+    </p:tnLst>
+  </p:timing>
+</p:sld>
+</file>
+
+<file path=ppt/slides/slide4.xml><?xml version="1.0" encoding="utf-8"?>
 <p:sld xmlns:a="http://schemas.openxmlformats.org/drawingml/2006/main" xmlns:r="http://schemas.openxmlformats.org/officeDocument/2006/relationships" xmlns:p="http://schemas.openxmlformats.org/presentationml/2006/main">
   <p:cSld>
     <p:spTree>
@@ -4137,7 +4866,7 @@
 </p:sld>
 </file>
 
-<file path=ppt/slides/slide4.xml><?xml version="1.0" encoding="utf-8"?>
+<file path=ppt/slides/slide5.xml><?xml version="1.0" encoding="utf-8"?>
 <p:sld xmlns:a="http://schemas.openxmlformats.org/drawingml/2006/main" xmlns:r="http://schemas.openxmlformats.org/officeDocument/2006/relationships" xmlns:p="http://schemas.openxmlformats.org/presentationml/2006/main">
   <p:cSld>
     <p:spTree>
@@ -4234,8 +4963,8 @@
           <a:lstStyle/>
           <a:p>
             <a:r>
-              <a:rPr lang="en-GB" dirty="0" smtClean="0"/>
-              <a:t>Matrix</a:t>
+              <a:rPr lang="en-GB" dirty="0" err="1" smtClean="0"/>
+              <a:t>Solutioneering</a:t>
             </a:r>
             <a:endParaRPr lang="en-GB" dirty="0"/>
           </a:p>
@@ -4401,7 +5130,7 @@
 </p:sld>
 </file>
 
-<file path=ppt/slides/slide5.xml><?xml version="1.0" encoding="utf-8"?>
+<file path=ppt/slides/slide6.xml><?xml version="1.0" encoding="utf-8"?>
 <p:sld xmlns:a="http://schemas.openxmlformats.org/drawingml/2006/main" xmlns:r="http://schemas.openxmlformats.org/officeDocument/2006/relationships" xmlns:p="http://schemas.openxmlformats.org/presentationml/2006/main">
   <p:cSld>
     <p:spTree>
@@ -4525,7 +5254,7 @@
 </p:sld>
 </file>
 
-<file path=ppt/slides/slide6.xml><?xml version="1.0" encoding="utf-8"?>
+<file path=ppt/slides/slide7.xml><?xml version="1.0" encoding="utf-8"?>
 <p:sld xmlns:a="http://schemas.openxmlformats.org/drawingml/2006/main" xmlns:r="http://schemas.openxmlformats.org/officeDocument/2006/relationships" xmlns:p="http://schemas.openxmlformats.org/presentationml/2006/main">
   <p:cSld>
     <p:spTree>
@@ -4567,7 +5296,7 @@
       </p:sp>
       <p:pic>
         <p:nvPicPr>
-          <p:cNvPr id="4101" name="Picture 5"/>
+          <p:cNvPr id="1026" name="Picture 2"/>
           <p:cNvPicPr>
             <a:picLocks noChangeAspect="1" noChangeArrowheads="1"/>
           </p:cNvPicPr>
@@ -4588,8 +5317,8 @@
         </p:blipFill>
         <p:spPr bwMode="auto">
           <a:xfrm>
-            <a:off x="-47929" y="980728"/>
-            <a:ext cx="9239859" cy="5381822"/>
+            <a:off x="-55600" y="419949"/>
+            <a:ext cx="9255200" cy="6537443"/>
           </a:xfrm>
           <a:prstGeom prst="rect">
             <a:avLst/>
@@ -4646,6 +5375,221 @@
       </p:par>
     </p:tnLst>
   </p:timing>
+</p:sld>
+</file>
+
+<file path=ppt/slides/slide8.xml><?xml version="1.0" encoding="utf-8"?>
+<p:sld xmlns:a="http://schemas.openxmlformats.org/drawingml/2006/main" xmlns:r="http://schemas.openxmlformats.org/officeDocument/2006/relationships" xmlns:p="http://schemas.openxmlformats.org/presentationml/2006/main">
+  <p:cSld>
+    <p:spTree>
+      <p:nvGrpSpPr>
+        <p:cNvPr id="1" name=""/>
+        <p:cNvGrpSpPr/>
+        <p:nvPr/>
+      </p:nvGrpSpPr>
+      <p:grpSpPr>
+        <a:xfrm>
+          <a:off x="0" y="0"/>
+          <a:ext cx="0" cy="0"/>
+          <a:chOff x="0" y="0"/>
+          <a:chExt cx="0" cy="0"/>
+        </a:xfrm>
+      </p:grpSpPr>
+      <p:sp>
+        <p:nvSpPr>
+          <p:cNvPr id="2" name="Title 1"/>
+          <p:cNvSpPr>
+            <a:spLocks noGrp="1"/>
+          </p:cNvSpPr>
+          <p:nvPr>
+            <p:ph type="title"/>
+          </p:nvPr>
+        </p:nvSpPr>
+        <p:spPr/>
+        <p:txBody>
+          <a:bodyPr/>
+          <a:lstStyle/>
+          <a:p>
+            <a:r>
+              <a:rPr lang="en-GB" dirty="0" smtClean="0"/>
+              <a:t>Java</a:t>
+            </a:r>
+            <a:endParaRPr lang="en-GB" dirty="0"/>
+          </a:p>
+        </p:txBody>
+      </p:sp>
+      <p:sp>
+        <p:nvSpPr>
+          <p:cNvPr id="3" name="Content Placeholder 2"/>
+          <p:cNvSpPr>
+            <a:spLocks noGrp="1"/>
+          </p:cNvSpPr>
+          <p:nvPr>
+            <p:ph idx="1"/>
+          </p:nvPr>
+        </p:nvSpPr>
+        <p:spPr/>
+        <p:txBody>
+          <a:bodyPr>
+            <a:normAutofit lnSpcReduction="10000"/>
+          </a:bodyPr>
+          <a:lstStyle/>
+          <a:p>
+            <a:r>
+              <a:rPr lang="en-GB" dirty="0" smtClean="0"/>
+              <a:t>Reference equality</a:t>
+            </a:r>
+          </a:p>
+          <a:p>
+            <a:r>
+              <a:rPr lang="en-GB" dirty="0"/>
+              <a:t>Nulls</a:t>
+            </a:r>
+          </a:p>
+          <a:p>
+            <a:r>
+              <a:rPr lang="en-GB" dirty="0" smtClean="0"/>
+              <a:t>Default visibility</a:t>
+            </a:r>
+          </a:p>
+          <a:p>
+            <a:r>
+              <a:rPr lang="en-GB" dirty="0" smtClean="0"/>
+              <a:t>Procedural</a:t>
+            </a:r>
+          </a:p>
+          <a:p>
+            <a:r>
+              <a:rPr lang="en-GB" dirty="0" smtClean="0"/>
+              <a:t>Informal invariants</a:t>
+            </a:r>
+          </a:p>
+          <a:p>
+            <a:r>
+              <a:rPr lang="en-GB" dirty="0" smtClean="0"/>
+              <a:t>Painful to initialise</a:t>
+            </a:r>
+          </a:p>
+        </p:txBody>
+      </p:sp>
+    </p:spTree>
+    <p:extLst>
+      <p:ext uri="{BB962C8B-B14F-4D97-AF65-F5344CB8AC3E}">
+        <p14:creationId xmlns:p14="http://schemas.microsoft.com/office/powerpoint/2010/main" val="823743727"/>
+      </p:ext>
+    </p:extLst>
+  </p:cSld>
+  <p:clrMapOvr>
+    <a:masterClrMapping/>
+  </p:clrMapOvr>
+</p:sld>
+</file>
+
+<file path=ppt/slides/slide9.xml><?xml version="1.0" encoding="utf-8"?>
+<p:sld xmlns:a="http://schemas.openxmlformats.org/drawingml/2006/main" xmlns:r="http://schemas.openxmlformats.org/officeDocument/2006/relationships" xmlns:p="http://schemas.openxmlformats.org/presentationml/2006/main">
+  <p:cSld>
+    <p:spTree>
+      <p:nvGrpSpPr>
+        <p:cNvPr id="1" name=""/>
+        <p:cNvGrpSpPr/>
+        <p:nvPr/>
+      </p:nvGrpSpPr>
+      <p:grpSpPr>
+        <a:xfrm>
+          <a:off x="0" y="0"/>
+          <a:ext cx="0" cy="0"/>
+          <a:chOff x="0" y="0"/>
+          <a:chExt cx="0" cy="0"/>
+        </a:xfrm>
+      </p:grpSpPr>
+      <p:sp>
+        <p:nvSpPr>
+          <p:cNvPr id="2" name="Title 1"/>
+          <p:cNvSpPr>
+            <a:spLocks noGrp="1"/>
+          </p:cNvSpPr>
+          <p:nvPr>
+            <p:ph type="title"/>
+          </p:nvPr>
+        </p:nvSpPr>
+        <p:spPr/>
+        <p:txBody>
+          <a:bodyPr/>
+          <a:lstStyle/>
+          <a:p>
+            <a:r>
+              <a:rPr lang="en-GB" dirty="0" smtClean="0"/>
+              <a:t>JSizzle</a:t>
+            </a:r>
+            <a:endParaRPr lang="en-GB" dirty="0"/>
+          </a:p>
+        </p:txBody>
+      </p:sp>
+      <p:sp>
+        <p:nvSpPr>
+          <p:cNvPr id="3" name="Content Placeholder 2"/>
+          <p:cNvSpPr>
+            <a:spLocks noGrp="1"/>
+          </p:cNvSpPr>
+          <p:nvPr>
+            <p:ph idx="1"/>
+          </p:nvPr>
+        </p:nvSpPr>
+        <p:spPr/>
+        <p:txBody>
+          <a:bodyPr>
+            <a:normAutofit lnSpcReduction="10000"/>
+          </a:bodyPr>
+          <a:lstStyle/>
+          <a:p>
+            <a:r>
+              <a:rPr lang="en-GB" dirty="0" smtClean="0"/>
+              <a:t>Value equality</a:t>
+            </a:r>
+          </a:p>
+          <a:p>
+            <a:r>
+              <a:rPr lang="en-GB" dirty="0" smtClean="0"/>
+              <a:t>No nulls</a:t>
+            </a:r>
+          </a:p>
+          <a:p>
+            <a:r>
+              <a:rPr lang="en-GB" dirty="0" smtClean="0"/>
+              <a:t>Everything public &amp; final</a:t>
+            </a:r>
+          </a:p>
+          <a:p>
+            <a:r>
+              <a:rPr lang="en-GB" dirty="0" smtClean="0"/>
+              <a:t>Declarative</a:t>
+            </a:r>
+          </a:p>
+          <a:p>
+            <a:r>
+              <a:rPr lang="en-GB" dirty="0" smtClean="0"/>
+              <a:t>Invariant checking</a:t>
+            </a:r>
+          </a:p>
+          <a:p>
+            <a:r>
+              <a:rPr lang="en-GB" dirty="0" smtClean="0"/>
+              <a:t>Generated initialisers</a:t>
+            </a:r>
+            <a:endParaRPr lang="en-GB" dirty="0"/>
+          </a:p>
+        </p:txBody>
+      </p:sp>
+    </p:spTree>
+    <p:extLst>
+      <p:ext uri="{BB962C8B-B14F-4D97-AF65-F5344CB8AC3E}">
+        <p14:creationId xmlns:p14="http://schemas.microsoft.com/office/powerpoint/2010/main" val="1691172659"/>
+      </p:ext>
+    </p:extLst>
+  </p:cSld>
+  <p:clrMapOvr>
+    <a:masterClrMapping/>
+  </p:clrMapOvr>
 </p:sld>
 </file>
 

</xml_diff>

<commit_message>
Tidy up & reset for presentation
</commit_message>
<xml_diff>
--- a/JSizzle-Demo/doc/Modelling in Java.pptx
+++ b/JSizzle-Demo/doc/Modelling in Java.pptx
@@ -5,20 +5,21 @@
     <p:sldMasterId id="2147483648" r:id="rId1"/>
   </p:sldMasterIdLst>
   <p:notesMasterIdLst>
-    <p:notesMasterId r:id="rId13"/>
+    <p:notesMasterId r:id="rId14"/>
   </p:notesMasterIdLst>
   <p:sldIdLst>
     <p:sldId id="256" r:id="rId2"/>
     <p:sldId id="257" r:id="rId3"/>
-    <p:sldId id="262" r:id="rId4"/>
-    <p:sldId id="258" r:id="rId5"/>
-    <p:sldId id="259" r:id="rId6"/>
-    <p:sldId id="260" r:id="rId7"/>
-    <p:sldId id="261" r:id="rId8"/>
-    <p:sldId id="265" r:id="rId9"/>
-    <p:sldId id="266" r:id="rId10"/>
-    <p:sldId id="269" r:id="rId11"/>
-    <p:sldId id="268" r:id="rId12"/>
+    <p:sldId id="270" r:id="rId4"/>
+    <p:sldId id="262" r:id="rId5"/>
+    <p:sldId id="258" r:id="rId6"/>
+    <p:sldId id="259" r:id="rId7"/>
+    <p:sldId id="260" r:id="rId8"/>
+    <p:sldId id="261" r:id="rId9"/>
+    <p:sldId id="265" r:id="rId10"/>
+    <p:sldId id="266" r:id="rId11"/>
+    <p:sldId id="269" r:id="rId12"/>
+    <p:sldId id="268" r:id="rId13"/>
   </p:sldIdLst>
   <p:sldSz cx="9144000" cy="6858000" type="screen4x3"/>
   <p:notesSz cx="6858000" cy="9144000"/>
@@ -202,7 +203,7 @@
           <a:p>
             <a:fld id="{67D0FCD1-96C9-4CE8-8EF3-744D3F3FBA66}" type="datetimeFigureOut">
               <a:rPr lang="en-GB" smtClean="0"/>
-              <a:t>25/02/2012</a:t>
+              <a:t>03/03/2012</a:t>
             </a:fld>
             <a:endParaRPr lang="en-GB"/>
           </a:p>
@@ -516,43 +517,54 @@
           <a:p>
             <a:r>
               <a:rPr lang="en-GB" dirty="0" smtClean="0"/>
-              <a:t>Worked example</a:t>
+              <a:t>15 </a:t>
+            </a:r>
+            <a:r>
+              <a:rPr lang="en-GB" dirty="0" err="1" smtClean="0"/>
+              <a:t>yrs</a:t>
+            </a:r>
+            <a:endParaRPr lang="en-GB" dirty="0" smtClean="0"/>
+          </a:p>
+          <a:p>
+            <a:pPr marL="0" marR="0" indent="0" algn="l" defTabSz="914400" rtl="0" eaLnBrk="1" fontAlgn="auto" latinLnBrk="0" hangingPunct="1">
+              <a:lnSpc>
+                <a:spcPct val="100000"/>
+              </a:lnSpc>
+              <a:spcBef>
+                <a:spcPts val="0"/>
+              </a:spcBef>
+              <a:spcAft>
+                <a:spcPts val="0"/>
+              </a:spcAft>
+              <a:buClrTx/>
+              <a:buSzTx/>
+              <a:buFontTx/>
+              <a:buNone/>
+              <a:tabLst/>
+              <a:defRPr/>
+            </a:pPr>
+            <a:r>
+              <a:rPr lang="en-GB" baseline="0" dirty="0" smtClean="0"/>
+              <a:t>O-O</a:t>
             </a:r>
           </a:p>
           <a:p>
             <a:r>
               <a:rPr lang="en-GB" dirty="0" smtClean="0"/>
-              <a:t>Modelling: state-based</a:t>
-            </a:r>
-          </a:p>
-          <a:p>
-            <a:r>
-              <a:rPr lang="en-GB" dirty="0" smtClean="0"/>
-              <a:t>Model-driven</a:t>
+              <a:t>50,000</a:t>
             </a:r>
             <a:r>
               <a:rPr lang="en-GB" baseline="0" dirty="0" smtClean="0"/>
-              <a:t>: not MDD</a:t>
-            </a:r>
-            <a:endParaRPr lang="en-GB" dirty="0" smtClean="0"/>
-          </a:p>
-          <a:p>
-            <a:r>
-              <a:rPr lang="en-GB" dirty="0" smtClean="0"/>
-              <a:t>Java: tools &amp; implementation</a:t>
-            </a:r>
-          </a:p>
-          <a:p>
-            <a:r>
-              <a:rPr lang="en-GB" dirty="0" smtClean="0"/>
-              <a:t>JCurry: tangentially</a:t>
-            </a:r>
-          </a:p>
-          <a:p>
-            <a:r>
-              <a:rPr lang="en-GB" dirty="0" smtClean="0"/>
-              <a:t>JSizzle: exemplar, scratching surface</a:t>
-            </a:r>
+              <a:t> scientists</a:t>
+            </a:r>
+          </a:p>
+          <a:p>
+            <a:r>
+              <a:rPr lang="en-GB" baseline="0" dirty="0" smtClean="0"/>
+              <a:t>2006 SEM</a:t>
+            </a:r>
+          </a:p>
+          <a:p>
             <a:endParaRPr lang="en-GB" dirty="0"/>
           </a:p>
         </p:txBody>
@@ -574,7 +586,7 @@
           <a:p>
             <a:fld id="{FA02D333-9BE1-4B85-91BF-F46F8636CE68}" type="slidenum">
               <a:rPr lang="en-GB" smtClean="0"/>
-              <a:t>3</a:t>
+              <a:t>2</a:t>
             </a:fld>
             <a:endParaRPr lang="en-GB"/>
           </a:p>
@@ -583,7 +595,107 @@
     </p:spTree>
     <p:extLst>
       <p:ext uri="{BB962C8B-B14F-4D97-AF65-F5344CB8AC3E}">
-        <p14:creationId xmlns:p14="http://schemas.microsoft.com/office/powerpoint/2010/main" val="3796217703"/>
+        <p14:creationId xmlns:p14="http://schemas.microsoft.com/office/powerpoint/2010/main" val="3331229400"/>
+      </p:ext>
+    </p:extLst>
+  </p:cSld>
+  <p:clrMapOvr>
+    <a:masterClrMapping/>
+  </p:clrMapOvr>
+</p:notes>
+</file>
+
+<file path=ppt/notesSlides/notesSlide10.xml><?xml version="1.0" encoding="utf-8"?>
+<p:notes xmlns:a="http://schemas.openxmlformats.org/drawingml/2006/main" xmlns:r="http://schemas.openxmlformats.org/officeDocument/2006/relationships" xmlns:p="http://schemas.openxmlformats.org/presentationml/2006/main">
+  <p:cSld>
+    <p:spTree>
+      <p:nvGrpSpPr>
+        <p:cNvPr id="1" name=""/>
+        <p:cNvGrpSpPr/>
+        <p:nvPr/>
+      </p:nvGrpSpPr>
+      <p:grpSpPr>
+        <a:xfrm>
+          <a:off x="0" y="0"/>
+          <a:ext cx="0" cy="0"/>
+          <a:chOff x="0" y="0"/>
+          <a:chExt cx="0" cy="0"/>
+        </a:xfrm>
+      </p:grpSpPr>
+      <p:sp>
+        <p:nvSpPr>
+          <p:cNvPr id="2" name="Slide Image Placeholder 1"/>
+          <p:cNvSpPr>
+            <a:spLocks noGrp="1" noRot="1" noChangeAspect="1"/>
+          </p:cNvSpPr>
+          <p:nvPr>
+            <p:ph type="sldImg"/>
+          </p:nvPr>
+        </p:nvSpPr>
+        <p:spPr/>
+      </p:sp>
+      <p:sp>
+        <p:nvSpPr>
+          <p:cNvPr id="3" name="Notes Placeholder 2"/>
+          <p:cNvSpPr>
+            <a:spLocks noGrp="1"/>
+          </p:cNvSpPr>
+          <p:nvPr>
+            <p:ph type="body" idx="1"/>
+          </p:nvPr>
+        </p:nvSpPr>
+        <p:spPr/>
+        <p:txBody>
+          <a:bodyPr/>
+          <a:lstStyle/>
+          <a:p>
+            <a:r>
+              <a:rPr lang="en-GB" baseline="0" dirty="0" smtClean="0"/>
+              <a:t>Z: Designed to be alike; </a:t>
+            </a:r>
+          </a:p>
+          <a:p>
+            <a:r>
+              <a:rPr lang="en-GB" baseline="0" dirty="0" smtClean="0"/>
+              <a:t>Transitions: behavioural</a:t>
+            </a:r>
+          </a:p>
+          <a:p>
+            <a:r>
+              <a:rPr lang="en-GB" baseline="0" dirty="0" smtClean="0"/>
+              <a:t>Export -&gt; model checking</a:t>
+            </a:r>
+            <a:endParaRPr lang="en-GB" dirty="0"/>
+          </a:p>
+        </p:txBody>
+      </p:sp>
+      <p:sp>
+        <p:nvSpPr>
+          <p:cNvPr id="4" name="Slide Number Placeholder 3"/>
+          <p:cNvSpPr>
+            <a:spLocks noGrp="1"/>
+          </p:cNvSpPr>
+          <p:nvPr>
+            <p:ph type="sldNum" sz="quarter" idx="10"/>
+          </p:nvPr>
+        </p:nvSpPr>
+        <p:spPr/>
+        <p:txBody>
+          <a:bodyPr/>
+          <a:lstStyle/>
+          <a:p>
+            <a:fld id="{FA02D333-9BE1-4B85-91BF-F46F8636CE68}" type="slidenum">
+              <a:rPr lang="en-GB" smtClean="0"/>
+              <a:t>12</a:t>
+            </a:fld>
+            <a:endParaRPr lang="en-GB"/>
+          </a:p>
+        </p:txBody>
+      </p:sp>
+    </p:spTree>
+    <p:extLst>
+      <p:ext uri="{BB962C8B-B14F-4D97-AF65-F5344CB8AC3E}">
+        <p14:creationId xmlns:p14="http://schemas.microsoft.com/office/powerpoint/2010/main" val="628476071"/>
       </p:ext>
     </p:extLst>
   </p:cSld>
@@ -639,21 +751,47 @@
           <a:p>
             <a:r>
               <a:rPr lang="en-GB" dirty="0" smtClean="0"/>
-              <a:t>Number happy, unhappy</a:t>
+              <a:t>Worked example</a:t>
             </a:r>
           </a:p>
           <a:p>
             <a:r>
               <a:rPr lang="en-GB" dirty="0" smtClean="0"/>
-              <a:t>Behaviour </a:t>
-            </a:r>
-            <a:r>
-              <a:rPr lang="en-GB" dirty="0" err="1" smtClean="0"/>
-              <a:t>vs</a:t>
-            </a:r>
+              <a:t>Modelling: state-based</a:t>
+            </a:r>
+          </a:p>
+          <a:p>
             <a:r>
               <a:rPr lang="en-GB" dirty="0" smtClean="0"/>
-              <a:t> state modelling</a:t>
+              <a:t>Model-driven</a:t>
+            </a:r>
+            <a:r>
+              <a:rPr lang="en-GB" baseline="0" dirty="0" smtClean="0"/>
+              <a:t>: not MDD</a:t>
+            </a:r>
+            <a:endParaRPr lang="en-GB" dirty="0" smtClean="0"/>
+          </a:p>
+          <a:p>
+            <a:r>
+              <a:rPr lang="en-GB" dirty="0" smtClean="0"/>
+              <a:t>Java: tools &amp; implementation</a:t>
+            </a:r>
+          </a:p>
+          <a:p>
+            <a:r>
+              <a:rPr lang="en-GB" dirty="0" smtClean="0"/>
+              <a:t>JCurry: </a:t>
+            </a:r>
+            <a:r>
+              <a:rPr lang="en-GB" dirty="0" smtClean="0"/>
+              <a:t>tangentially; functional programming</a:t>
+            </a:r>
+            <a:endParaRPr lang="en-GB" dirty="0" smtClean="0"/>
+          </a:p>
+          <a:p>
+            <a:r>
+              <a:rPr lang="en-GB" dirty="0" smtClean="0"/>
+              <a:t>JSizzle: exemplar, scratching surface, history</a:t>
             </a:r>
             <a:endParaRPr lang="en-GB" dirty="0"/>
           </a:p>
@@ -685,7 +823,7 @@
     </p:spTree>
     <p:extLst>
       <p:ext uri="{BB962C8B-B14F-4D97-AF65-F5344CB8AC3E}">
-        <p14:creationId xmlns:p14="http://schemas.microsoft.com/office/powerpoint/2010/main" val="1850191238"/>
+        <p14:creationId xmlns:p14="http://schemas.microsoft.com/office/powerpoint/2010/main" val="3796217703"/>
       </p:ext>
     </p:extLst>
   </p:cSld>
@@ -741,10 +879,53 @@
           <a:p>
             <a:r>
               <a:rPr lang="en-GB" dirty="0" smtClean="0"/>
-              <a:t>Constraints?</a:t>
-            </a:r>
-          </a:p>
-          <a:p>
+              <a:t>New</a:t>
+            </a:r>
+            <a:r>
+              <a:rPr lang="en-GB" baseline="0" dirty="0" smtClean="0"/>
+              <a:t> system – [requirements/stories] – [domain analysis] – specification – state model (begin terminology)</a:t>
+            </a:r>
+            <a:endParaRPr lang="en-GB" dirty="0" smtClean="0"/>
+          </a:p>
+          <a:p>
+            <a:r>
+              <a:rPr lang="en-GB" dirty="0" smtClean="0"/>
+              <a:t>-----</a:t>
+            </a:r>
+          </a:p>
+          <a:p>
+            <a:r>
+              <a:rPr lang="en-GB" dirty="0" smtClean="0"/>
+              <a:t>Number </a:t>
+            </a:r>
+            <a:r>
+              <a:rPr lang="en-GB" dirty="0" smtClean="0"/>
+              <a:t>happy, unhappy</a:t>
+            </a:r>
+          </a:p>
+          <a:p>
+            <a:r>
+              <a:rPr lang="en-GB" dirty="0" smtClean="0"/>
+              <a:t>Behaviour </a:t>
+            </a:r>
+            <a:r>
+              <a:rPr lang="en-GB" dirty="0" err="1" smtClean="0"/>
+              <a:t>vs</a:t>
+            </a:r>
+            <a:r>
+              <a:rPr lang="en-GB" dirty="0" smtClean="0"/>
+              <a:t> state </a:t>
+            </a:r>
+            <a:r>
+              <a:rPr lang="en-GB" dirty="0" smtClean="0"/>
+              <a:t>modelling</a:t>
+            </a:r>
+          </a:p>
+          <a:p>
+            <a:r>
+              <a:rPr lang="en-GB" dirty="0" smtClean="0"/>
+              <a:t>What is wrong?</a:t>
+            </a:r>
             <a:endParaRPr lang="en-GB" dirty="0"/>
           </a:p>
         </p:txBody>
@@ -766,7 +947,7 @@
           <a:p>
             <a:fld id="{FA02D333-9BE1-4B85-91BF-F46F8636CE68}" type="slidenum">
               <a:rPr lang="en-GB" smtClean="0"/>
-              <a:t>6</a:t>
+              <a:t>5</a:t>
             </a:fld>
             <a:endParaRPr lang="en-GB"/>
           </a:p>
@@ -775,7 +956,7 @@
     </p:spTree>
     <p:extLst>
       <p:ext uri="{BB962C8B-B14F-4D97-AF65-F5344CB8AC3E}">
-        <p14:creationId xmlns:p14="http://schemas.microsoft.com/office/powerpoint/2010/main" val="2618552895"/>
+        <p14:creationId xmlns:p14="http://schemas.microsoft.com/office/powerpoint/2010/main" val="1850191238"/>
       </p:ext>
     </p:extLst>
   </p:cSld>
@@ -829,10 +1010,7 @@
           <a:bodyPr/>
           <a:lstStyle/>
           <a:p>
-            <a:r>
-              <a:rPr lang="en-GB" dirty="0" smtClean="0"/>
-              <a:t>Notation</a:t>
-            </a:r>
+            <a:endParaRPr lang="en-GB" dirty="0"/>
           </a:p>
         </p:txBody>
       </p:sp>
@@ -853,7 +1031,7 @@
           <a:p>
             <a:fld id="{FA02D333-9BE1-4B85-91BF-F46F8636CE68}" type="slidenum">
               <a:rPr lang="en-GB" smtClean="0"/>
-              <a:t>7</a:t>
+              <a:t>6</a:t>
             </a:fld>
             <a:endParaRPr lang="en-GB"/>
           </a:p>
@@ -862,7 +1040,7 @@
     </p:spTree>
     <p:extLst>
       <p:ext uri="{BB962C8B-B14F-4D97-AF65-F5344CB8AC3E}">
-        <p14:creationId xmlns:p14="http://schemas.microsoft.com/office/powerpoint/2010/main" val="730106914"/>
+        <p14:creationId xmlns:p14="http://schemas.microsoft.com/office/powerpoint/2010/main" val="649505894"/>
       </p:ext>
     </p:extLst>
   </p:cSld>
@@ -916,13 +1094,50 @@
           <a:bodyPr/>
           <a:lstStyle/>
           <a:p>
+            <a:pPr marL="0" marR="0" indent="0" algn="l" defTabSz="914400" rtl="0" eaLnBrk="1" fontAlgn="auto" latinLnBrk="0" hangingPunct="1">
+              <a:lnSpc>
+                <a:spcPct val="100000"/>
+              </a:lnSpc>
+              <a:spcBef>
+                <a:spcPts val="0"/>
+              </a:spcBef>
+              <a:spcAft>
+                <a:spcPts val="0"/>
+              </a:spcAft>
+              <a:buClrTx/>
+              <a:buSzTx/>
+              <a:buFontTx/>
+              <a:buNone/>
+              <a:tabLst/>
+              <a:defRPr/>
+            </a:pPr>
             <a:r>
               <a:rPr lang="en-GB" dirty="0" smtClean="0"/>
-              <a:t>Initialisers</a:t>
+              <a:t>Constraints? Number of cells = product of items</a:t>
+            </a:r>
+          </a:p>
+          <a:p>
+            <a:r>
+              <a:rPr lang="en-GB" dirty="0" smtClean="0"/>
+              <a:t>Could say</a:t>
             </a:r>
             <a:r>
               <a:rPr lang="en-GB" baseline="0" dirty="0" smtClean="0"/>
-              <a:t>: allow animation</a:t>
+              <a:t> categories + items </a:t>
+            </a:r>
+            <a:r>
+              <a:rPr lang="en-GB" i="1" baseline="0" dirty="0" smtClean="0"/>
+              <a:t>define</a:t>
+            </a:r>
+            <a:r>
+              <a:rPr lang="en-GB" i="0" baseline="0" dirty="0" smtClean="0"/>
+              <a:t> cells</a:t>
+            </a:r>
+          </a:p>
+          <a:p>
+            <a:r>
+              <a:rPr lang="en-GB" i="0" baseline="0" dirty="0" smtClean="0"/>
+              <a:t>Where to put values? Valid addresses</a:t>
             </a:r>
             <a:endParaRPr lang="en-GB" dirty="0"/>
           </a:p>
@@ -945,7 +1160,7 @@
           <a:p>
             <a:fld id="{FA02D333-9BE1-4B85-91BF-F46F8636CE68}" type="slidenum">
               <a:rPr lang="en-GB" smtClean="0"/>
-              <a:t>9</a:t>
+              <a:t>7</a:t>
             </a:fld>
             <a:endParaRPr lang="en-GB"/>
           </a:p>
@@ -954,7 +1169,7 @@
     </p:spTree>
     <p:extLst>
       <p:ext uri="{BB962C8B-B14F-4D97-AF65-F5344CB8AC3E}">
-        <p14:creationId xmlns:p14="http://schemas.microsoft.com/office/powerpoint/2010/main" val="654099180"/>
+        <p14:creationId xmlns:p14="http://schemas.microsoft.com/office/powerpoint/2010/main" val="2618552895"/>
       </p:ext>
     </p:extLst>
   </p:cSld>
@@ -1010,33 +1225,21 @@
           <a:p>
             <a:r>
               <a:rPr lang="en-GB" dirty="0" smtClean="0"/>
-              <a:t>Options:</a:t>
-            </a:r>
-            <a:r>
-              <a:rPr lang="en-GB" baseline="0" dirty="0" smtClean="0"/>
-              <a:t> in mapping code (e.g. abstract list)</a:t>
-            </a:r>
-          </a:p>
-          <a:p>
-            <a:r>
-              <a:rPr lang="en-GB" baseline="0" dirty="0" smtClean="0"/>
-              <a:t>Gap: Size of QAPI/</a:t>
-            </a:r>
-            <a:r>
-              <a:rPr lang="en-GB" baseline="0" dirty="0" err="1" smtClean="0"/>
-              <a:t>Impl</a:t>
-            </a:r>
-            <a:r>
-              <a:rPr lang="en-GB" baseline="0" dirty="0" smtClean="0"/>
-              <a:t> vs. model</a:t>
-            </a:r>
-          </a:p>
-          <a:p>
-            <a:r>
-              <a:rPr lang="en-GB" baseline="0" dirty="0" smtClean="0"/>
-              <a:t>Also features (e.g. groups)</a:t>
-            </a:r>
-            <a:endParaRPr lang="en-GB" dirty="0"/>
+              <a:t>Notation</a:t>
+            </a:r>
+          </a:p>
+          <a:p>
+            <a:r>
+              <a:rPr lang="en-GB" dirty="0" smtClean="0"/>
+              <a:t>-----</a:t>
+            </a:r>
+          </a:p>
+          <a:p>
+            <a:r>
+              <a:rPr lang="en-GB" dirty="0" smtClean="0"/>
+              <a:t>Go to demo</a:t>
+            </a:r>
+            <a:endParaRPr lang="en-GB" dirty="0" smtClean="0"/>
           </a:p>
         </p:txBody>
       </p:sp>
@@ -1057,7 +1260,7 @@
           <a:p>
             <a:fld id="{FA02D333-9BE1-4B85-91BF-F46F8636CE68}" type="slidenum">
               <a:rPr lang="en-GB" smtClean="0"/>
-              <a:t>10</a:t>
+              <a:t>8</a:t>
             </a:fld>
             <a:endParaRPr lang="en-GB"/>
           </a:p>
@@ -1066,7 +1269,7 @@
     </p:spTree>
     <p:extLst>
       <p:ext uri="{BB962C8B-B14F-4D97-AF65-F5344CB8AC3E}">
-        <p14:creationId xmlns:p14="http://schemas.microsoft.com/office/powerpoint/2010/main" val="2160544336"/>
+        <p14:creationId xmlns:p14="http://schemas.microsoft.com/office/powerpoint/2010/main" val="730106914"/>
       </p:ext>
     </p:extLst>
   </p:cSld>
@@ -1121,14 +1324,212 @@
           <a:lstStyle/>
           <a:p>
             <a:r>
+              <a:rPr lang="en-GB" dirty="0" smtClean="0"/>
+              <a:t>Dragging around Java semantics</a:t>
+            </a:r>
+            <a:endParaRPr lang="en-GB" dirty="0"/>
+          </a:p>
+        </p:txBody>
+      </p:sp>
+      <p:sp>
+        <p:nvSpPr>
+          <p:cNvPr id="4" name="Slide Number Placeholder 3"/>
+          <p:cNvSpPr>
+            <a:spLocks noGrp="1"/>
+          </p:cNvSpPr>
+          <p:nvPr>
+            <p:ph type="sldNum" sz="quarter" idx="10"/>
+          </p:nvPr>
+        </p:nvSpPr>
+        <p:spPr/>
+        <p:txBody>
+          <a:bodyPr/>
+          <a:lstStyle/>
+          <a:p>
+            <a:fld id="{FA02D333-9BE1-4B85-91BF-F46F8636CE68}" type="slidenum">
+              <a:rPr lang="en-GB" smtClean="0"/>
+              <a:t>9</a:t>
+            </a:fld>
+            <a:endParaRPr lang="en-GB"/>
+          </a:p>
+        </p:txBody>
+      </p:sp>
+    </p:spTree>
+    <p:extLst>
+      <p:ext uri="{BB962C8B-B14F-4D97-AF65-F5344CB8AC3E}">
+        <p14:creationId xmlns:p14="http://schemas.microsoft.com/office/powerpoint/2010/main" val="270008064"/>
+      </p:ext>
+    </p:extLst>
+  </p:cSld>
+  <p:clrMapOvr>
+    <a:masterClrMapping/>
+  </p:clrMapOvr>
+</p:notes>
+</file>
+
+<file path=ppt/notesSlides/notesSlide8.xml><?xml version="1.0" encoding="utf-8"?>
+<p:notes xmlns:a="http://schemas.openxmlformats.org/drawingml/2006/main" xmlns:r="http://schemas.openxmlformats.org/officeDocument/2006/relationships" xmlns:p="http://schemas.openxmlformats.org/presentationml/2006/main">
+  <p:cSld>
+    <p:spTree>
+      <p:nvGrpSpPr>
+        <p:cNvPr id="1" name=""/>
+        <p:cNvGrpSpPr/>
+        <p:nvPr/>
+      </p:nvGrpSpPr>
+      <p:grpSpPr>
+        <a:xfrm>
+          <a:off x="0" y="0"/>
+          <a:ext cx="0" cy="0"/>
+          <a:chOff x="0" y="0"/>
+          <a:chExt cx="0" cy="0"/>
+        </a:xfrm>
+      </p:grpSpPr>
+      <p:sp>
+        <p:nvSpPr>
+          <p:cNvPr id="2" name="Slide Image Placeholder 1"/>
+          <p:cNvSpPr>
+            <a:spLocks noGrp="1" noRot="1" noChangeAspect="1"/>
+          </p:cNvSpPr>
+          <p:nvPr>
+            <p:ph type="sldImg"/>
+          </p:nvPr>
+        </p:nvSpPr>
+        <p:spPr/>
+      </p:sp>
+      <p:sp>
+        <p:nvSpPr>
+          <p:cNvPr id="3" name="Notes Placeholder 2"/>
+          <p:cNvSpPr>
+            <a:spLocks noGrp="1"/>
+          </p:cNvSpPr>
+          <p:nvPr>
+            <p:ph type="body" idx="1"/>
+          </p:nvPr>
+        </p:nvSpPr>
+        <p:spPr/>
+        <p:txBody>
+          <a:bodyPr/>
+          <a:lstStyle/>
+          <a:p>
+            <a:r>
+              <a:rPr lang="en-GB" dirty="0" smtClean="0"/>
+              <a:t>Initialisers</a:t>
+            </a:r>
+            <a:r>
               <a:rPr lang="en-GB" baseline="0" dirty="0" smtClean="0"/>
-              <a:t>Z: Designed to be alike; </a:t>
-            </a:r>
-          </a:p>
-          <a:p>
+              <a:t>: allow animation</a:t>
+            </a:r>
+            <a:endParaRPr lang="en-GB" dirty="0"/>
+          </a:p>
+        </p:txBody>
+      </p:sp>
+      <p:sp>
+        <p:nvSpPr>
+          <p:cNvPr id="4" name="Slide Number Placeholder 3"/>
+          <p:cNvSpPr>
+            <a:spLocks noGrp="1"/>
+          </p:cNvSpPr>
+          <p:nvPr>
+            <p:ph type="sldNum" sz="quarter" idx="10"/>
+          </p:nvPr>
+        </p:nvSpPr>
+        <p:spPr/>
+        <p:txBody>
+          <a:bodyPr/>
+          <a:lstStyle/>
+          <a:p>
+            <a:fld id="{FA02D333-9BE1-4B85-91BF-F46F8636CE68}" type="slidenum">
+              <a:rPr lang="en-GB" smtClean="0"/>
+              <a:t>10</a:t>
+            </a:fld>
+            <a:endParaRPr lang="en-GB"/>
+          </a:p>
+        </p:txBody>
+      </p:sp>
+    </p:spTree>
+    <p:extLst>
+      <p:ext uri="{BB962C8B-B14F-4D97-AF65-F5344CB8AC3E}">
+        <p14:creationId xmlns:p14="http://schemas.microsoft.com/office/powerpoint/2010/main" val="654099180"/>
+      </p:ext>
+    </p:extLst>
+  </p:cSld>
+  <p:clrMapOvr>
+    <a:masterClrMapping/>
+  </p:clrMapOvr>
+</p:notes>
+</file>
+
+<file path=ppt/notesSlides/notesSlide9.xml><?xml version="1.0" encoding="utf-8"?>
+<p:notes xmlns:a="http://schemas.openxmlformats.org/drawingml/2006/main" xmlns:r="http://schemas.openxmlformats.org/officeDocument/2006/relationships" xmlns:p="http://schemas.openxmlformats.org/presentationml/2006/main">
+  <p:cSld>
+    <p:spTree>
+      <p:nvGrpSpPr>
+        <p:cNvPr id="1" name=""/>
+        <p:cNvGrpSpPr/>
+        <p:nvPr/>
+      </p:nvGrpSpPr>
+      <p:grpSpPr>
+        <a:xfrm>
+          <a:off x="0" y="0"/>
+          <a:ext cx="0" cy="0"/>
+          <a:chOff x="0" y="0"/>
+          <a:chExt cx="0" cy="0"/>
+        </a:xfrm>
+      </p:grpSpPr>
+      <p:sp>
+        <p:nvSpPr>
+          <p:cNvPr id="2" name="Slide Image Placeholder 1"/>
+          <p:cNvSpPr>
+            <a:spLocks noGrp="1" noRot="1" noChangeAspect="1"/>
+          </p:cNvSpPr>
+          <p:nvPr>
+            <p:ph type="sldImg"/>
+          </p:nvPr>
+        </p:nvSpPr>
+        <p:spPr/>
+      </p:sp>
+      <p:sp>
+        <p:nvSpPr>
+          <p:cNvPr id="3" name="Notes Placeholder 2"/>
+          <p:cNvSpPr>
+            <a:spLocks noGrp="1"/>
+          </p:cNvSpPr>
+          <p:nvPr>
+            <p:ph type="body" idx="1"/>
+          </p:nvPr>
+        </p:nvSpPr>
+        <p:spPr/>
+        <p:txBody>
+          <a:bodyPr/>
+          <a:lstStyle/>
+          <a:p>
+            <a:r>
+              <a:rPr lang="en-GB" dirty="0" smtClean="0"/>
+              <a:t>Options:</a:t>
+            </a:r>
             <a:r>
               <a:rPr lang="en-GB" baseline="0" dirty="0" smtClean="0"/>
-              <a:t>Transitions: behavioural</a:t>
+              <a:t> in mapping code (e.g. abstract list)</a:t>
+            </a:r>
+          </a:p>
+          <a:p>
+            <a:r>
+              <a:rPr lang="en-GB" baseline="0" dirty="0" smtClean="0"/>
+              <a:t>Gap: Size of QAPI/</a:t>
+            </a:r>
+            <a:r>
+              <a:rPr lang="en-GB" baseline="0" dirty="0" err="1" smtClean="0"/>
+              <a:t>Impl</a:t>
+            </a:r>
+            <a:r>
+              <a:rPr lang="en-GB" baseline="0" dirty="0" smtClean="0"/>
+              <a:t> vs. model</a:t>
+            </a:r>
+          </a:p>
+          <a:p>
+            <a:r>
+              <a:rPr lang="en-GB" baseline="0" dirty="0" smtClean="0"/>
+              <a:t>Also features (e.g. groups)</a:t>
             </a:r>
             <a:endParaRPr lang="en-GB" dirty="0"/>
           </a:p>
@@ -1160,7 +1561,7 @@
     </p:spTree>
     <p:extLst>
       <p:ext uri="{BB962C8B-B14F-4D97-AF65-F5344CB8AC3E}">
-        <p14:creationId xmlns:p14="http://schemas.microsoft.com/office/powerpoint/2010/main" val="628476071"/>
+        <p14:creationId xmlns:p14="http://schemas.microsoft.com/office/powerpoint/2010/main" val="2160544336"/>
       </p:ext>
     </p:extLst>
   </p:cSld>
@@ -1351,7 +1752,7 @@
           <a:p>
             <a:fld id="{69F27632-3644-44C9-B417-C0B620760139}" type="datetimeFigureOut">
               <a:rPr lang="en-GB" smtClean="0"/>
-              <a:t>25/02/2012</a:t>
+              <a:t>03/03/2012</a:t>
             </a:fld>
             <a:endParaRPr lang="en-GB"/>
           </a:p>
@@ -1521,7 +1922,7 @@
           <a:p>
             <a:fld id="{69F27632-3644-44C9-B417-C0B620760139}" type="datetimeFigureOut">
               <a:rPr lang="en-GB" smtClean="0"/>
-              <a:t>25/02/2012</a:t>
+              <a:t>03/03/2012</a:t>
             </a:fld>
             <a:endParaRPr lang="en-GB"/>
           </a:p>
@@ -1701,7 +2102,7 @@
           <a:p>
             <a:fld id="{69F27632-3644-44C9-B417-C0B620760139}" type="datetimeFigureOut">
               <a:rPr lang="en-GB" smtClean="0"/>
-              <a:t>25/02/2012</a:t>
+              <a:t>03/03/2012</a:t>
             </a:fld>
             <a:endParaRPr lang="en-GB"/>
           </a:p>
@@ -1903,7 +2304,7 @@
           <a:p>
             <a:fld id="{69F27632-3644-44C9-B417-C0B620760139}" type="datetimeFigureOut">
               <a:rPr lang="en-GB" smtClean="0"/>
-              <a:t>25/02/2012</a:t>
+              <a:t>03/03/2012</a:t>
             </a:fld>
             <a:endParaRPr lang="en-GB"/>
           </a:p>
@@ -2149,7 +2550,7 @@
           <a:p>
             <a:fld id="{69F27632-3644-44C9-B417-C0B620760139}" type="datetimeFigureOut">
               <a:rPr lang="en-GB" smtClean="0"/>
-              <a:t>25/02/2012</a:t>
+              <a:t>03/03/2012</a:t>
             </a:fld>
             <a:endParaRPr lang="en-GB"/>
           </a:p>
@@ -2437,7 +2838,7 @@
           <a:p>
             <a:fld id="{69F27632-3644-44C9-B417-C0B620760139}" type="datetimeFigureOut">
               <a:rPr lang="en-GB" smtClean="0"/>
-              <a:t>25/02/2012</a:t>
+              <a:t>03/03/2012</a:t>
             </a:fld>
             <a:endParaRPr lang="en-GB"/>
           </a:p>
@@ -2859,7 +3260,7 @@
           <a:p>
             <a:fld id="{69F27632-3644-44C9-B417-C0B620760139}" type="datetimeFigureOut">
               <a:rPr lang="en-GB" smtClean="0"/>
-              <a:t>25/02/2012</a:t>
+              <a:t>03/03/2012</a:t>
             </a:fld>
             <a:endParaRPr lang="en-GB"/>
           </a:p>
@@ -2977,7 +3378,7 @@
           <a:p>
             <a:fld id="{69F27632-3644-44C9-B417-C0B620760139}" type="datetimeFigureOut">
               <a:rPr lang="en-GB" smtClean="0"/>
-              <a:t>25/02/2012</a:t>
+              <a:t>03/03/2012</a:t>
             </a:fld>
             <a:endParaRPr lang="en-GB"/>
           </a:p>
@@ -3072,7 +3473,7 @@
           <a:p>
             <a:fld id="{69F27632-3644-44C9-B417-C0B620760139}" type="datetimeFigureOut">
               <a:rPr lang="en-GB" smtClean="0"/>
-              <a:t>25/02/2012</a:t>
+              <a:t>03/03/2012</a:t>
             </a:fld>
             <a:endParaRPr lang="en-GB"/>
           </a:p>
@@ -3349,7 +3750,7 @@
           <a:p>
             <a:fld id="{69F27632-3644-44C9-B417-C0B620760139}" type="datetimeFigureOut">
               <a:rPr lang="en-GB" smtClean="0"/>
-              <a:t>25/02/2012</a:t>
+              <a:t>03/03/2012</a:t>
             </a:fld>
             <a:endParaRPr lang="en-GB"/>
           </a:p>
@@ -3602,7 +4003,7 @@
           <a:p>
             <a:fld id="{69F27632-3644-44C9-B417-C0B620760139}" type="datetimeFigureOut">
               <a:rPr lang="en-GB" smtClean="0"/>
-              <a:t>25/02/2012</a:t>
+              <a:t>03/03/2012</a:t>
             </a:fld>
             <a:endParaRPr lang="en-GB"/>
           </a:p>
@@ -3815,7 +4216,7 @@
           <a:p>
             <a:fld id="{69F27632-3644-44C9-B417-C0B620760139}" type="datetimeFigureOut">
               <a:rPr lang="en-GB" smtClean="0"/>
-              <a:t>25/02/2012</a:t>
+              <a:t>03/03/2012</a:t>
             </a:fld>
             <a:endParaRPr lang="en-GB"/>
           </a:p>
@@ -4306,7 +4707,7 @@
           <a:p>
             <a:r>
               <a:rPr lang="en-GB" dirty="0" smtClean="0"/>
-              <a:t>Instrumentation</a:t>
+              <a:t>JSizzle</a:t>
             </a:r>
             <a:endParaRPr lang="en-GB" dirty="0"/>
           </a:p>
@@ -4324,39 +4725,44 @@
         </p:nvSpPr>
         <p:spPr/>
         <p:txBody>
-          <a:bodyPr/>
+          <a:bodyPr>
+            <a:normAutofit lnSpcReduction="10000"/>
+          </a:bodyPr>
           <a:lstStyle/>
           <a:p>
             <a:r>
               <a:rPr lang="en-GB" dirty="0" smtClean="0"/>
-              <a:t>Lots </a:t>
-            </a:r>
+              <a:t>Value equality</a:t>
+            </a:r>
+          </a:p>
+          <a:p>
             <a:r>
               <a:rPr lang="en-GB" dirty="0" smtClean="0"/>
-              <a:t>of options (it’s Java</a:t>
-            </a:r>
+              <a:t>No nulls</a:t>
+            </a:r>
+          </a:p>
+          <a:p>
             <a:r>
               <a:rPr lang="en-GB" dirty="0" smtClean="0"/>
-              <a:t>!)</a:t>
+              <a:t>Everything public &amp; final</a:t>
             </a:r>
           </a:p>
           <a:p>
             <a:r>
               <a:rPr lang="en-GB" dirty="0" smtClean="0"/>
-              <a:t>Abstraction gap</a:t>
-            </a:r>
-            <a:endParaRPr lang="en-GB" dirty="0" smtClean="0"/>
+              <a:t>Declarative</a:t>
+            </a:r>
           </a:p>
           <a:p>
             <a:r>
               <a:rPr lang="en-GB" dirty="0" smtClean="0"/>
-              <a:t>Ad-hoc animation</a:t>
+              <a:t>Invariant checking</a:t>
             </a:r>
           </a:p>
           <a:p>
             <a:r>
               <a:rPr lang="en-GB" dirty="0" smtClean="0"/>
-              <a:t>Unit tests</a:t>
+              <a:t>Generated initialisers</a:t>
             </a:r>
             <a:endParaRPr lang="en-GB" dirty="0"/>
           </a:p>
@@ -4365,13 +4771,20 @@
     </p:spTree>
     <p:extLst>
       <p:ext uri="{BB962C8B-B14F-4D97-AF65-F5344CB8AC3E}">
-        <p14:creationId xmlns:p14="http://schemas.microsoft.com/office/powerpoint/2010/main" val="930596272"/>
+        <p14:creationId xmlns:p14="http://schemas.microsoft.com/office/powerpoint/2010/main" val="1691172659"/>
       </p:ext>
     </p:extLst>
   </p:cSld>
   <p:clrMapOvr>
     <a:masterClrMapping/>
   </p:clrMapOvr>
+  <p:timing>
+    <p:tnLst>
+      <p:par>
+        <p:cTn id="1" dur="indefinite" restart="never" nodeType="tmRoot"/>
+      </p:par>
+    </p:tnLst>
+  </p:timing>
 </p:sld>
 </file>
 
@@ -4409,6 +4822,107 @@
           <a:p>
             <a:r>
               <a:rPr lang="en-GB" dirty="0" smtClean="0"/>
+              <a:t>Instrumentation</a:t>
+            </a:r>
+            <a:endParaRPr lang="en-GB" dirty="0"/>
+          </a:p>
+        </p:txBody>
+      </p:sp>
+      <p:sp>
+        <p:nvSpPr>
+          <p:cNvPr id="3" name="Content Placeholder 2"/>
+          <p:cNvSpPr>
+            <a:spLocks noGrp="1"/>
+          </p:cNvSpPr>
+          <p:nvPr>
+            <p:ph idx="1"/>
+          </p:nvPr>
+        </p:nvSpPr>
+        <p:spPr/>
+        <p:txBody>
+          <a:bodyPr/>
+          <a:lstStyle/>
+          <a:p>
+            <a:r>
+              <a:rPr lang="en-GB" dirty="0" smtClean="0"/>
+              <a:t>Lots of options (it’s Java!)</a:t>
+            </a:r>
+          </a:p>
+          <a:p>
+            <a:r>
+              <a:rPr lang="en-GB" dirty="0" smtClean="0"/>
+              <a:t>Abstraction gap</a:t>
+            </a:r>
+          </a:p>
+          <a:p>
+            <a:r>
+              <a:rPr lang="en-GB" dirty="0" smtClean="0"/>
+              <a:t>Ad-hoc animation</a:t>
+            </a:r>
+          </a:p>
+          <a:p>
+            <a:r>
+              <a:rPr lang="en-GB" dirty="0" smtClean="0"/>
+              <a:t>Unit tests</a:t>
+            </a:r>
+            <a:endParaRPr lang="en-GB" dirty="0"/>
+          </a:p>
+        </p:txBody>
+      </p:sp>
+    </p:spTree>
+    <p:extLst>
+      <p:ext uri="{BB962C8B-B14F-4D97-AF65-F5344CB8AC3E}">
+        <p14:creationId xmlns:p14="http://schemas.microsoft.com/office/powerpoint/2010/main" val="930596272"/>
+      </p:ext>
+    </p:extLst>
+  </p:cSld>
+  <p:clrMapOvr>
+    <a:masterClrMapping/>
+  </p:clrMapOvr>
+  <p:timing>
+    <p:tnLst>
+      <p:par>
+        <p:cTn id="1" dur="indefinite" restart="never" nodeType="tmRoot"/>
+      </p:par>
+    </p:tnLst>
+  </p:timing>
+</p:sld>
+</file>
+
+<file path=ppt/slides/slide12.xml><?xml version="1.0" encoding="utf-8"?>
+<p:sld xmlns:a="http://schemas.openxmlformats.org/drawingml/2006/main" xmlns:r="http://schemas.openxmlformats.org/officeDocument/2006/relationships" xmlns:p="http://schemas.openxmlformats.org/presentationml/2006/main">
+  <p:cSld>
+    <p:spTree>
+      <p:nvGrpSpPr>
+        <p:cNvPr id="1" name=""/>
+        <p:cNvGrpSpPr/>
+        <p:nvPr/>
+      </p:nvGrpSpPr>
+      <p:grpSpPr>
+        <a:xfrm>
+          <a:off x="0" y="0"/>
+          <a:ext cx="0" cy="0"/>
+          <a:chOff x="0" y="0"/>
+          <a:chExt cx="0" cy="0"/>
+        </a:xfrm>
+      </p:grpSpPr>
+      <p:sp>
+        <p:nvSpPr>
+          <p:cNvPr id="2" name="Title 1"/>
+          <p:cNvSpPr>
+            <a:spLocks noGrp="1"/>
+          </p:cNvSpPr>
+          <p:nvPr>
+            <p:ph type="title"/>
+          </p:nvPr>
+        </p:nvSpPr>
+        <p:spPr/>
+        <p:txBody>
+          <a:bodyPr/>
+          <a:lstStyle/>
+          <a:p>
+            <a:r>
+              <a:rPr lang="en-GB" dirty="0" smtClean="0"/>
               <a:t>Z Influence</a:t>
             </a:r>
             <a:endParaRPr lang="en-GB" dirty="0"/>
@@ -4429,12 +4943,6 @@
         <p:txBody>
           <a:bodyPr/>
           <a:lstStyle/>
-          <a:p>
-            <a:r>
-              <a:rPr lang="en-GB" dirty="0" smtClean="0"/>
-              <a:t>Export to Z</a:t>
-            </a:r>
-          </a:p>
           <a:p>
             <a:r>
               <a:rPr lang="en-GB" dirty="0" smtClean="0"/>
@@ -4446,6 +4954,17 @@
               <a:rPr lang="en-GB" dirty="0" smtClean="0"/>
               <a:t>Promotion</a:t>
             </a:r>
+          </a:p>
+          <a:p>
+            <a:r>
+              <a:rPr lang="en-GB" dirty="0"/>
+              <a:t>Export to </a:t>
+            </a:r>
+            <a:r>
+              <a:rPr lang="en-GB" dirty="0" smtClean="0"/>
+              <a:t>Z</a:t>
+            </a:r>
+            <a:endParaRPr lang="en-GB" dirty="0"/>
           </a:p>
         </p:txBody>
       </p:sp>
@@ -4459,6 +4978,13 @@
   <p:clrMapOvr>
     <a:masterClrMapping/>
   </p:clrMapOvr>
+  <p:timing>
+    <p:tnLst>
+      <p:par>
+        <p:cTn id="1" dur="indefinite" restart="never" nodeType="tmRoot"/>
+      </p:par>
+    </p:tnLst>
+  </p:timing>
 </p:sld>
 </file>
 
@@ -4525,20 +5051,6 @@
             </a:r>
           </a:p>
           <a:p>
-            <a:r>
-              <a:rPr lang="en-GB" dirty="0" smtClean="0"/>
-              <a:t>MA (</a:t>
-            </a:r>
-            <a:r>
-              <a:rPr lang="en-GB" dirty="0" err="1" smtClean="0"/>
-              <a:t>Cantab</a:t>
-            </a:r>
-            <a:r>
-              <a:rPr lang="en-GB" dirty="0" smtClean="0"/>
-              <a:t>) MSc (Oxon)</a:t>
-            </a:r>
-          </a:p>
-          <a:p>
             <a:endParaRPr lang="en-GB" dirty="0"/>
           </a:p>
           <a:p>
@@ -4552,17 +5064,6 @@
               <a:rPr lang="en-GB" sz="2000" dirty="0" smtClean="0"/>
               <a:t>gsvarovsky@idbs.com</a:t>
             </a:r>
-          </a:p>
-          <a:p>
-            <a:r>
-              <a:rPr lang="en-GB" sz="2000" dirty="0" smtClean="0"/>
-              <a:t>@</a:t>
-            </a:r>
-            <a:r>
-              <a:rPr lang="en-GB" sz="2000" dirty="0" err="1" smtClean="0"/>
-              <a:t>gsvarovsky</a:t>
-            </a:r>
-            <a:endParaRPr lang="en-GB" sz="2000" dirty="0" smtClean="0"/>
           </a:p>
           <a:p>
             <a:r>
@@ -4611,29 +5112,6 @@
       </p:grpSpPr>
       <p:sp>
         <p:nvSpPr>
-          <p:cNvPr id="2" name="Title 1"/>
-          <p:cNvSpPr>
-            <a:spLocks noGrp="1"/>
-          </p:cNvSpPr>
-          <p:nvPr>
-            <p:ph type="title"/>
-          </p:nvPr>
-        </p:nvSpPr>
-        <p:spPr/>
-        <p:txBody>
-          <a:bodyPr/>
-          <a:lstStyle/>
-          <a:p>
-            <a:r>
-              <a:rPr lang="en-GB" dirty="0" smtClean="0"/>
-              <a:t>This</a:t>
-            </a:r>
-            <a:endParaRPr lang="en-GB" dirty="0"/>
-          </a:p>
-        </p:txBody>
-      </p:sp>
-      <p:sp>
-        <p:nvSpPr>
           <p:cNvPr id="3" name="Content Placeholder 2"/>
           <p:cNvSpPr>
             <a:spLocks noGrp="1"/>
@@ -4647,42 +5125,53 @@
           <a:bodyPr/>
           <a:lstStyle/>
           <a:p>
-            <a:r>
-              <a:rPr lang="en-GB" dirty="0" smtClean="0"/>
-              <a:t>Modelling</a:t>
-            </a:r>
-          </a:p>
-          <a:p>
-            <a:r>
-              <a:rPr lang="en-GB" dirty="0" smtClean="0"/>
-              <a:t>Model-driven development</a:t>
-            </a:r>
-          </a:p>
-          <a:p>
-            <a:r>
-              <a:rPr lang="en-GB" dirty="0" smtClean="0"/>
-              <a:t>Java</a:t>
-            </a:r>
-          </a:p>
-          <a:p>
-            <a:r>
-              <a:rPr lang="en-GB" dirty="0" smtClean="0"/>
-              <a:t>JCurry</a:t>
-            </a:r>
-          </a:p>
-          <a:p>
-            <a:r>
-              <a:rPr lang="en-GB" dirty="0" smtClean="0"/>
-              <a:t>JSizzle </a:t>
-            </a:r>
-            <a:endParaRPr lang="en-GB" dirty="0"/>
-          </a:p>
-        </p:txBody>
-      </p:sp>
+            <a:endParaRPr lang="en-GB"/>
+          </a:p>
+        </p:txBody>
+      </p:sp>
+      <p:pic>
+        <p:nvPicPr>
+          <p:cNvPr id="1026" name="Picture 2" descr="C:\Users\GSvarovsky\Pictures\2011-08-07 Phone\Phone 008.jpg"/>
+          <p:cNvPicPr>
+            <a:picLocks noChangeAspect="1" noChangeArrowheads="1"/>
+          </p:cNvPicPr>
+          <p:nvPr/>
+        </p:nvPicPr>
+        <p:blipFill rotWithShape="1">
+          <a:blip r:embed="rId2">
+            <a:extLst>
+              <a:ext uri="{28A0092B-C50C-407E-A947-70E740481C1C}">
+                <a14:useLocalDpi xmlns:a14="http://schemas.microsoft.com/office/drawing/2010/main" val="0"/>
+              </a:ext>
+            </a:extLst>
+          </a:blip>
+          <a:srcRect l="16389" t="21789" r="16019" b="22077"/>
+          <a:stretch/>
+        </p:blipFill>
+        <p:spPr bwMode="auto">
+          <a:xfrm>
+            <a:off x="462419" y="677333"/>
+            <a:ext cx="8240889" cy="5475110"/>
+          </a:xfrm>
+          <a:prstGeom prst="rect">
+            <a:avLst/>
+          </a:prstGeom>
+          <a:noFill/>
+          <a:extLst>
+            <a:ext uri="{909E8E84-426E-40DD-AFC4-6F175D3DCCD1}">
+              <a14:hiddenFill xmlns:a14="http://schemas.microsoft.com/office/drawing/2010/main">
+                <a:solidFill>
+                  <a:srgbClr val="FFFFFF"/>
+                </a:solidFill>
+              </a14:hiddenFill>
+            </a:ext>
+          </a:extLst>
+        </p:spPr>
+      </p:pic>
     </p:spTree>
     <p:extLst>
       <p:ext uri="{BB962C8B-B14F-4D97-AF65-F5344CB8AC3E}">
-        <p14:creationId xmlns:p14="http://schemas.microsoft.com/office/powerpoint/2010/main" val="3596443664"/>
+        <p14:creationId xmlns:p14="http://schemas.microsoft.com/office/powerpoint/2010/main" val="3743042113"/>
       </p:ext>
     </p:extLst>
   </p:cSld>
@@ -4733,6 +5222,119 @@
           <a:p>
             <a:r>
               <a:rPr lang="en-GB" dirty="0" smtClean="0"/>
+              <a:t>This</a:t>
+            </a:r>
+            <a:endParaRPr lang="en-GB" dirty="0"/>
+          </a:p>
+        </p:txBody>
+      </p:sp>
+      <p:sp>
+        <p:nvSpPr>
+          <p:cNvPr id="3" name="Content Placeholder 2"/>
+          <p:cNvSpPr>
+            <a:spLocks noGrp="1"/>
+          </p:cNvSpPr>
+          <p:nvPr>
+            <p:ph idx="1"/>
+          </p:nvPr>
+        </p:nvSpPr>
+        <p:spPr/>
+        <p:txBody>
+          <a:bodyPr>
+            <a:normAutofit/>
+          </a:bodyPr>
+          <a:lstStyle/>
+          <a:p>
+            <a:r>
+              <a:rPr lang="en-GB" dirty="0" smtClean="0"/>
+              <a:t>Modelling</a:t>
+            </a:r>
+          </a:p>
+          <a:p>
+            <a:r>
+              <a:rPr lang="en-GB" dirty="0" smtClean="0"/>
+              <a:t>Model-driven </a:t>
+            </a:r>
+            <a:r>
+              <a:rPr lang="en-GB" dirty="0" smtClean="0"/>
+              <a:t>development</a:t>
+            </a:r>
+          </a:p>
+          <a:p>
+            <a:r>
+              <a:rPr lang="en-GB" dirty="0" smtClean="0"/>
+              <a:t>Java</a:t>
+            </a:r>
+          </a:p>
+          <a:p>
+            <a:r>
+              <a:rPr lang="en-GB" dirty="0" smtClean="0"/>
+              <a:t>JCurry</a:t>
+            </a:r>
+          </a:p>
+          <a:p>
+            <a:r>
+              <a:rPr lang="en-GB" dirty="0" smtClean="0"/>
+              <a:t>JSizzle </a:t>
+            </a:r>
+            <a:endParaRPr lang="en-GB" dirty="0"/>
+          </a:p>
+        </p:txBody>
+      </p:sp>
+    </p:spTree>
+    <p:extLst>
+      <p:ext uri="{BB962C8B-B14F-4D97-AF65-F5344CB8AC3E}">
+        <p14:creationId xmlns:p14="http://schemas.microsoft.com/office/powerpoint/2010/main" val="3596443664"/>
+      </p:ext>
+    </p:extLst>
+  </p:cSld>
+  <p:clrMapOvr>
+    <a:masterClrMapping/>
+  </p:clrMapOvr>
+  <p:timing>
+    <p:tnLst>
+      <p:par>
+        <p:cTn id="1" dur="indefinite" restart="never" nodeType="tmRoot"/>
+      </p:par>
+    </p:tnLst>
+  </p:timing>
+</p:sld>
+</file>
+
+<file path=ppt/slides/slide5.xml><?xml version="1.0" encoding="utf-8"?>
+<p:sld xmlns:a="http://schemas.openxmlformats.org/drawingml/2006/main" xmlns:r="http://schemas.openxmlformats.org/officeDocument/2006/relationships" xmlns:p="http://schemas.openxmlformats.org/presentationml/2006/main">
+  <p:cSld>
+    <p:spTree>
+      <p:nvGrpSpPr>
+        <p:cNvPr id="1" name=""/>
+        <p:cNvGrpSpPr/>
+        <p:nvPr/>
+      </p:nvGrpSpPr>
+      <p:grpSpPr>
+        <a:xfrm>
+          <a:off x="0" y="0"/>
+          <a:ext cx="0" cy="0"/>
+          <a:chOff x="0" y="0"/>
+          <a:chExt cx="0" cy="0"/>
+        </a:xfrm>
+      </p:grpSpPr>
+      <p:sp>
+        <p:nvSpPr>
+          <p:cNvPr id="2" name="Title 1"/>
+          <p:cNvSpPr>
+            <a:spLocks noGrp="1"/>
+          </p:cNvSpPr>
+          <p:nvPr>
+            <p:ph type="title"/>
+          </p:nvPr>
+        </p:nvSpPr>
+        <p:spPr/>
+        <p:txBody>
+          <a:bodyPr/>
+          <a:lstStyle/>
+          <a:p>
+            <a:r>
+              <a:rPr lang="en-GB" dirty="0" smtClean="0"/>
               <a:t>You</a:t>
             </a:r>
             <a:endParaRPr lang="en-GB" dirty="0"/>
@@ -4756,22 +5358,30 @@
           <a:p>
             <a:pPr algn="ctr"/>
             <a:r>
+              <a:rPr lang="en-GB" dirty="0"/>
+              <a:t>Z?</a:t>
+            </a:r>
+          </a:p>
+          <a:p>
+            <a:pPr algn="ctr"/>
+            <a:r>
               <a:rPr lang="en-GB" dirty="0" smtClean="0"/>
-              <a:t>UML?</a:t>
+              <a:t>UML</a:t>
+            </a:r>
+            <a:r>
+              <a:rPr lang="en-GB" dirty="0" smtClean="0"/>
+              <a:t>?</a:t>
             </a:r>
           </a:p>
           <a:p>
             <a:pPr algn="ctr"/>
             <a:r>
               <a:rPr lang="en-GB" dirty="0" smtClean="0"/>
-              <a:t>Z?</a:t>
-            </a:r>
-          </a:p>
-          <a:p>
-            <a:pPr algn="ctr"/>
+              <a:t>Other</a:t>
+            </a:r>
             <a:r>
               <a:rPr lang="en-GB" dirty="0" smtClean="0"/>
-              <a:t>Other..?</a:t>
+              <a:t>..?</a:t>
             </a:r>
           </a:p>
           <a:p>
@@ -4866,7 +5476,7 @@
 </p:sld>
 </file>
 
-<file path=ppt/slides/slide5.xml><?xml version="1.0" encoding="utf-8"?>
+<file path=ppt/slides/slide6.xml><?xml version="1.0" encoding="utf-8"?>
 <p:sld xmlns:a="http://schemas.openxmlformats.org/drawingml/2006/main" xmlns:r="http://schemas.openxmlformats.org/officeDocument/2006/relationships" xmlns:p="http://schemas.openxmlformats.org/presentationml/2006/main">
   <p:cSld>
     <p:spTree>
@@ -4892,7 +5502,7 @@
           <p:nvPr/>
         </p:nvPicPr>
         <p:blipFill>
-          <a:blip r:embed="rId2">
+          <a:blip r:embed="rId3">
             <a:extLst>
               <a:ext uri="{28A0092B-C50C-407E-A947-70E740481C1C}">
                 <a14:useLocalDpi xmlns:a14="http://schemas.microsoft.com/office/drawing/2010/main" val="0"/>
@@ -4979,7 +5589,7 @@
           <p:nvPr/>
         </p:nvPicPr>
         <p:blipFill>
-          <a:blip r:embed="rId3">
+          <a:blip r:embed="rId4">
             <a:extLst>
               <a:ext uri="{28A0092B-C50C-407E-A947-70E740481C1C}">
                 <a14:useLocalDpi xmlns:a14="http://schemas.microsoft.com/office/drawing/2010/main" val="0"/>
@@ -5130,7 +5740,7 @@
 </p:sld>
 </file>
 
-<file path=ppt/slides/slide6.xml><?xml version="1.0" encoding="utf-8"?>
+<file path=ppt/slides/slide7.xml><?xml version="1.0" encoding="utf-8"?>
 <p:sld xmlns:a="http://schemas.openxmlformats.org/drawingml/2006/main" xmlns:r="http://schemas.openxmlformats.org/officeDocument/2006/relationships" xmlns:p="http://schemas.openxmlformats.org/presentationml/2006/main">
   <p:cSld>
     <p:spTree>
@@ -5254,7 +5864,7 @@
 </p:sld>
 </file>
 
-<file path=ppt/slides/slide7.xml><?xml version="1.0" encoding="utf-8"?>
+<file path=ppt/slides/slide8.xml><?xml version="1.0" encoding="utf-8"?>
 <p:sld xmlns:a="http://schemas.openxmlformats.org/drawingml/2006/main" xmlns:r="http://schemas.openxmlformats.org/officeDocument/2006/relationships" xmlns:p="http://schemas.openxmlformats.org/presentationml/2006/main">
   <p:cSld>
     <p:spTree>
@@ -5378,113 +5988,6 @@
 </p:sld>
 </file>
 
-<file path=ppt/slides/slide8.xml><?xml version="1.0" encoding="utf-8"?>
-<p:sld xmlns:a="http://schemas.openxmlformats.org/drawingml/2006/main" xmlns:r="http://schemas.openxmlformats.org/officeDocument/2006/relationships" xmlns:p="http://schemas.openxmlformats.org/presentationml/2006/main">
-  <p:cSld>
-    <p:spTree>
-      <p:nvGrpSpPr>
-        <p:cNvPr id="1" name=""/>
-        <p:cNvGrpSpPr/>
-        <p:nvPr/>
-      </p:nvGrpSpPr>
-      <p:grpSpPr>
-        <a:xfrm>
-          <a:off x="0" y="0"/>
-          <a:ext cx="0" cy="0"/>
-          <a:chOff x="0" y="0"/>
-          <a:chExt cx="0" cy="0"/>
-        </a:xfrm>
-      </p:grpSpPr>
-      <p:sp>
-        <p:nvSpPr>
-          <p:cNvPr id="2" name="Title 1"/>
-          <p:cNvSpPr>
-            <a:spLocks noGrp="1"/>
-          </p:cNvSpPr>
-          <p:nvPr>
-            <p:ph type="title"/>
-          </p:nvPr>
-        </p:nvSpPr>
-        <p:spPr/>
-        <p:txBody>
-          <a:bodyPr/>
-          <a:lstStyle/>
-          <a:p>
-            <a:r>
-              <a:rPr lang="en-GB" dirty="0" smtClean="0"/>
-              <a:t>Java</a:t>
-            </a:r>
-            <a:endParaRPr lang="en-GB" dirty="0"/>
-          </a:p>
-        </p:txBody>
-      </p:sp>
-      <p:sp>
-        <p:nvSpPr>
-          <p:cNvPr id="3" name="Content Placeholder 2"/>
-          <p:cNvSpPr>
-            <a:spLocks noGrp="1"/>
-          </p:cNvSpPr>
-          <p:nvPr>
-            <p:ph idx="1"/>
-          </p:nvPr>
-        </p:nvSpPr>
-        <p:spPr/>
-        <p:txBody>
-          <a:bodyPr>
-            <a:normAutofit lnSpcReduction="10000"/>
-          </a:bodyPr>
-          <a:lstStyle/>
-          <a:p>
-            <a:r>
-              <a:rPr lang="en-GB" dirty="0" smtClean="0"/>
-              <a:t>Reference equality</a:t>
-            </a:r>
-          </a:p>
-          <a:p>
-            <a:r>
-              <a:rPr lang="en-GB" dirty="0"/>
-              <a:t>Nulls</a:t>
-            </a:r>
-          </a:p>
-          <a:p>
-            <a:r>
-              <a:rPr lang="en-GB" dirty="0" smtClean="0"/>
-              <a:t>Default visibility</a:t>
-            </a:r>
-          </a:p>
-          <a:p>
-            <a:r>
-              <a:rPr lang="en-GB" dirty="0" smtClean="0"/>
-              <a:t>Procedural</a:t>
-            </a:r>
-          </a:p>
-          <a:p>
-            <a:r>
-              <a:rPr lang="en-GB" dirty="0" smtClean="0"/>
-              <a:t>Informal invariants</a:t>
-            </a:r>
-          </a:p>
-          <a:p>
-            <a:r>
-              <a:rPr lang="en-GB" dirty="0" smtClean="0"/>
-              <a:t>Painful to initialise</a:t>
-            </a:r>
-          </a:p>
-        </p:txBody>
-      </p:sp>
-    </p:spTree>
-    <p:extLst>
-      <p:ext uri="{BB962C8B-B14F-4D97-AF65-F5344CB8AC3E}">
-        <p14:creationId xmlns:p14="http://schemas.microsoft.com/office/powerpoint/2010/main" val="823743727"/>
-      </p:ext>
-    </p:extLst>
-  </p:cSld>
-  <p:clrMapOvr>
-    <a:masterClrMapping/>
-  </p:clrMapOvr>
-</p:sld>
-</file>
-
 <file path=ppt/slides/slide9.xml><?xml version="1.0" encoding="utf-8"?>
 <p:sld xmlns:a="http://schemas.openxmlformats.org/drawingml/2006/main" xmlns:r="http://schemas.openxmlformats.org/officeDocument/2006/relationships" xmlns:p="http://schemas.openxmlformats.org/presentationml/2006/main">
   <p:cSld>
@@ -5519,7 +6022,7 @@
           <a:p>
             <a:r>
               <a:rPr lang="en-GB" dirty="0" smtClean="0"/>
-              <a:t>JSizzle</a:t>
+              <a:t>Java</a:t>
             </a:r>
             <a:endParaRPr lang="en-GB" dirty="0"/>
           </a:p>
@@ -5538,58 +6041,71 @@
         <p:spPr/>
         <p:txBody>
           <a:bodyPr>
-            <a:normAutofit lnSpcReduction="10000"/>
+            <a:normAutofit fontScale="92500" lnSpcReduction="20000"/>
           </a:bodyPr>
           <a:lstStyle/>
           <a:p>
             <a:r>
               <a:rPr lang="en-GB" dirty="0" smtClean="0"/>
-              <a:t>Value equality</a:t>
+              <a:t>Reference equality</a:t>
             </a:r>
           </a:p>
           <a:p>
             <a:r>
               <a:rPr lang="en-GB" dirty="0" smtClean="0"/>
-              <a:t>No nulls</a:t>
+              <a:t>Nulls</a:t>
             </a:r>
           </a:p>
           <a:p>
             <a:r>
               <a:rPr lang="en-GB" dirty="0" smtClean="0"/>
-              <a:t>Everything public &amp; final</a:t>
-            </a:r>
+              <a:t>Mutation</a:t>
+            </a:r>
+            <a:endParaRPr lang="en-GB" dirty="0"/>
           </a:p>
           <a:p>
             <a:r>
               <a:rPr lang="en-GB" dirty="0" smtClean="0"/>
-              <a:t>Declarative</a:t>
+              <a:t>Default visibility</a:t>
             </a:r>
           </a:p>
           <a:p>
             <a:r>
               <a:rPr lang="en-GB" dirty="0" smtClean="0"/>
-              <a:t>Invariant checking</a:t>
+              <a:t>Procedural</a:t>
             </a:r>
           </a:p>
           <a:p>
             <a:r>
               <a:rPr lang="en-GB" dirty="0" smtClean="0"/>
-              <a:t>Generated initialisers</a:t>
-            </a:r>
-            <a:endParaRPr lang="en-GB" dirty="0"/>
+              <a:t>Informal invariants</a:t>
+            </a:r>
+          </a:p>
+          <a:p>
+            <a:r>
+              <a:rPr lang="en-GB" dirty="0" smtClean="0"/>
+              <a:t>Painful to initialise</a:t>
+            </a:r>
           </a:p>
         </p:txBody>
       </p:sp>
     </p:spTree>
     <p:extLst>
       <p:ext uri="{BB962C8B-B14F-4D97-AF65-F5344CB8AC3E}">
-        <p14:creationId xmlns:p14="http://schemas.microsoft.com/office/powerpoint/2010/main" val="1691172659"/>
+        <p14:creationId xmlns:p14="http://schemas.microsoft.com/office/powerpoint/2010/main" val="823743727"/>
       </p:ext>
     </p:extLst>
   </p:cSld>
   <p:clrMapOvr>
     <a:masterClrMapping/>
   </p:clrMapOvr>
+  <p:timing>
+    <p:tnLst>
+      <p:par>
+        <p:cTn id="1" dur="indefinite" restart="never" nodeType="tmRoot"/>
+      </p:par>
+    </p:tnLst>
+  </p:timing>
 </p:sld>
 </file>
 

</xml_diff>